<commit_message>
updated figure 5 to use best rmse in Excel and PPT; added results section in report
</commit_message>
<xml_diff>
--- a/finalProject_RL_8803_fall2015.pptx
+++ b/finalProject_RL_8803_fall2015.pptx
@@ -312,7 +312,7 @@
           <a:p>
             <a:fld id="{ECD19FB2-3AAB-4D03-B13A-2960828C78E3}" type="datetimeFigureOut">
               <a:rPr lang="en-US" dirty="0"/>
-              <a:t>11/28/15</a:t>
+              <a:t>11/29/15</a:t>
             </a:fld>
             <a:endParaRPr lang="en-US" dirty="0"/>
           </a:p>
@@ -589,7 +589,7 @@
           <a:p>
             <a:fld id="{1B80C674-7DFC-42FE-B9CD-82963CDB1557}" type="datetimeFigureOut">
               <a:rPr lang="en-US" dirty="0"/>
-              <a:t>11/28/15</a:t>
+              <a:t>11/29/15</a:t>
             </a:fld>
             <a:endParaRPr lang="en-US" dirty="0"/>
           </a:p>
@@ -776,7 +776,7 @@
           <a:p>
             <a:fld id="{2076456F-F47D-4F25-8053-2A695DA0CA7D}" type="datetimeFigureOut">
               <a:rPr lang="en-US" dirty="0"/>
-              <a:t>11/28/15</a:t>
+              <a:t>11/29/15</a:t>
             </a:fld>
             <a:endParaRPr lang="en-US" dirty="0"/>
           </a:p>
@@ -1032,7 +1032,7 @@
           <a:p>
             <a:fld id="{5D6C7379-69CC-4837-9905-BEBA22830C8A}" type="datetimeFigureOut">
               <a:rPr lang="en-US" dirty="0"/>
-              <a:t>11/28/15</a:t>
+              <a:t>11/29/15</a:t>
             </a:fld>
             <a:endParaRPr lang="en-US" dirty="0"/>
           </a:p>
@@ -1453,7 +1453,7 @@
           <a:p>
             <a:fld id="{49EB8B7E-8AEE-4F10-BFEE-C999AD004D36}" type="datetimeFigureOut">
               <a:rPr lang="en-US" dirty="0"/>
-              <a:t>11/28/15</a:t>
+              <a:t>11/29/15</a:t>
             </a:fld>
             <a:endParaRPr lang="en-US" dirty="0"/>
           </a:p>
@@ -1994,7 +1994,7 @@
           <a:p>
             <a:fld id="{8668F3F9-58BC-440B-B37B-805B9055EF92}" type="datetimeFigureOut">
               <a:rPr lang="en-US" dirty="0"/>
-              <a:t>11/28/15</a:t>
+              <a:t>11/29/15</a:t>
             </a:fld>
             <a:endParaRPr lang="en-US" dirty="0"/>
           </a:p>
@@ -2820,7 +2820,7 @@
           <a:p>
             <a:fld id="{0D5A53AF-48EA-489D-8260-9DCAB666386A}" type="datetimeFigureOut">
               <a:rPr lang="en-US" dirty="0"/>
-              <a:t>11/28/15</a:t>
+              <a:t>11/29/15</a:t>
             </a:fld>
             <a:endParaRPr lang="en-US" dirty="0"/>
           </a:p>
@@ -2985,7 +2985,7 @@
           <a:p>
             <a:fld id="{0DED02AE-B9A4-47BD-AF8E-97E16144138B}" type="datetimeFigureOut">
               <a:rPr lang="en-US" dirty="0"/>
-              <a:t>11/28/15</a:t>
+              <a:t>11/29/15</a:t>
             </a:fld>
             <a:endParaRPr lang="en-US" dirty="0"/>
           </a:p>
@@ -3160,7 +3160,7 @@
           <a:p>
             <a:fld id="{CF0FD78B-DB02-4362-BCDC-98A55456977C}" type="datetimeFigureOut">
               <a:rPr lang="en-US" dirty="0"/>
-              <a:t>11/28/15</a:t>
+              <a:t>11/29/15</a:t>
             </a:fld>
             <a:endParaRPr lang="en-US" dirty="0"/>
           </a:p>
@@ -3325,7 +3325,7 @@
           <a:p>
             <a:fld id="{99916976-5D93-46E4-A98A-FAD63E4D0EA8}" type="datetimeFigureOut">
               <a:rPr lang="en-US" dirty="0"/>
-              <a:t>11/28/15</a:t>
+              <a:t>11/29/15</a:t>
             </a:fld>
             <a:endParaRPr lang="en-US" dirty="0"/>
           </a:p>
@@ -3577,7 +3577,7 @@
           <a:p>
             <a:fld id="{0F39F4F5-F4D2-4D2A-AB60-88D37ADCB869}" type="datetimeFigureOut">
               <a:rPr lang="en-US" dirty="0"/>
-              <a:t>11/28/15</a:t>
+              <a:t>11/29/15</a:t>
             </a:fld>
             <a:endParaRPr lang="en-US" dirty="0"/>
           </a:p>
@@ -3804,7 +3804,7 @@
           <a:p>
             <a:fld id="{D23BC6CE-6D1E-47E5-8859-F31AC5380EB2}" type="datetimeFigureOut">
               <a:rPr lang="en-US" dirty="0"/>
-              <a:t>11/28/15</a:t>
+              <a:t>11/29/15</a:t>
             </a:fld>
             <a:endParaRPr lang="en-US" dirty="0"/>
           </a:p>
@@ -4192,7 +4192,7 @@
           <a:p>
             <a:fld id="{B1B4E7C4-4DA4-404D-9965-B13F2DD7D8BF}" type="datetimeFigureOut">
               <a:rPr lang="en-US" dirty="0"/>
-              <a:t>11/28/15</a:t>
+              <a:t>11/29/15</a:t>
             </a:fld>
             <a:endParaRPr lang="en-US" dirty="0"/>
           </a:p>
@@ -4305,7 +4305,7 @@
           <a:p>
             <a:fld id="{476FB7AA-4A53-424F-AD41-70827B6504BA}" type="datetimeFigureOut">
               <a:rPr lang="en-US" dirty="0"/>
-              <a:t>11/28/15</a:t>
+              <a:t>11/29/15</a:t>
             </a:fld>
             <a:endParaRPr lang="en-US" dirty="0"/>
           </a:p>
@@ -4395,7 +4395,7 @@
           <a:p>
             <a:fld id="{E7884882-FB12-4BC8-9960-9AD8104D7FAE}" type="datetimeFigureOut">
               <a:rPr lang="en-US" dirty="0"/>
-              <a:t>11/28/15</a:t>
+              <a:t>11/29/15</a:t>
             </a:fld>
             <a:endParaRPr lang="en-US" dirty="0"/>
           </a:p>
@@ -4663,7 +4663,7 @@
           <a:p>
             <a:fld id="{F7D1BD23-6E54-4D9D-AD88-A2813C73CC25}" type="datetimeFigureOut">
               <a:rPr lang="en-US" dirty="0"/>
-              <a:t>11/28/15</a:t>
+              <a:t>11/29/15</a:t>
             </a:fld>
             <a:endParaRPr lang="en-US" dirty="0"/>
           </a:p>
@@ -4939,7 +4939,7 @@
           <a:p>
             <a:fld id="{1471A834-4F3C-4AF9-9C74-05EC35A0F292}" type="datetimeFigureOut">
               <a:rPr lang="en-US" dirty="0"/>
-              <a:t>11/28/15</a:t>
+              <a:t>11/29/15</a:t>
             </a:fld>
             <a:endParaRPr lang="en-US" dirty="0"/>
           </a:p>
@@ -5174,7 +5174,7 @@
           <a:p>
             <a:fld id="{51CF1133-3259-4C45-BABA-5B62D9C6F78D}" type="datetimeFigureOut">
               <a:rPr lang="en-US" dirty="0"/>
-              <a:t>11/28/15</a:t>
+              <a:t>11/29/15</a:t>
             </a:fld>
             <a:endParaRPr lang="en-US" dirty="0"/>
           </a:p>
@@ -5745,10 +5745,16 @@
         </p:nvSpPr>
         <p:spPr/>
         <p:txBody>
-          <a:bodyPr/>
-          <a:lstStyle/>
-          <a:p>
-            <a:endParaRPr lang="en-US"/>
+          <a:bodyPr>
+            <a:normAutofit/>
+          </a:bodyPr>
+          <a:lstStyle/>
+          <a:p>
+            <a:r>
+              <a:rPr lang="en-US" sz="6000" dirty="0" smtClean="0"/>
+              <a:t>5-step Random-Walking problem</a:t>
+            </a:r>
+            <a:endParaRPr lang="en-US" sz="6000" dirty="0"/>
           </a:p>
         </p:txBody>
       </p:sp>
@@ -5762,12 +5768,70 @@
             <p:ph type="subTitle" idx="1"/>
           </p:nvPr>
         </p:nvSpPr>
-        <p:spPr/>
-        <p:txBody>
-          <a:bodyPr/>
-          <a:lstStyle/>
-          <a:p>
-            <a:endParaRPr lang="en-US"/>
+        <p:spPr>
+          <a:xfrm>
+            <a:off x="2209799" y="3038623"/>
+            <a:ext cx="9144000" cy="1409778"/>
+          </a:xfrm>
+        </p:spPr>
+        <p:txBody>
+          <a:bodyPr>
+            <a:normAutofit/>
+          </a:bodyPr>
+          <a:lstStyle/>
+          <a:p>
+            <a:r>
+              <a:rPr lang="en-US" dirty="0"/>
+              <a:t>Fall 2015 CS8830 Reinforcement </a:t>
+            </a:r>
+            <a:r>
+              <a:rPr lang="en-US" dirty="0" smtClean="0"/>
+              <a:t>Learning </a:t>
+            </a:r>
+          </a:p>
+          <a:p>
+            <a:r>
+              <a:rPr lang="en-US" dirty="0" smtClean="0"/>
+              <a:t>Final Project</a:t>
+            </a:r>
+          </a:p>
+        </p:txBody>
+      </p:sp>
+      <p:sp>
+        <p:nvSpPr>
+          <p:cNvPr id="4" name="TextBox 3"/>
+          <p:cNvSpPr txBox="1"/>
+          <p:nvPr/>
+        </p:nvSpPr>
+        <p:spPr>
+          <a:xfrm>
+            <a:off x="6669258" y="5474814"/>
+            <a:ext cx="4684541" cy="646331"/>
+          </a:xfrm>
+          <a:prstGeom prst="rect">
+            <a:avLst/>
+          </a:prstGeom>
+          <a:noFill/>
+        </p:spPr>
+        <p:txBody>
+          <a:bodyPr wrap="square" rtlCol="0">
+            <a:spAutoFit/>
+          </a:bodyPr>
+          <a:lstStyle/>
+          <a:p>
+            <a:pPr algn="r"/>
+            <a:r>
+              <a:rPr lang="en-US" dirty="0" smtClean="0"/>
+              <a:t>Presenter: Qingyang Li </a:t>
+            </a:r>
+          </a:p>
+          <a:p>
+            <a:pPr algn="r"/>
+            <a:r>
+              <a:rPr lang="en-US" dirty="0" smtClean="0"/>
+              <a:t>GT user name:                  qli7</a:t>
+            </a:r>
+            <a:endParaRPr lang="en-US" dirty="0"/>
           </a:p>
         </p:txBody>
       </p:sp>
@@ -5823,7 +5887,11 @@
           <a:bodyPr/>
           <a:lstStyle/>
           <a:p>
-            <a:endParaRPr lang="en-US"/>
+            <a:r>
+              <a:rPr lang="en-US" dirty="0" smtClean="0"/>
+              <a:t>5-step Random-walking</a:t>
+            </a:r>
+            <a:endParaRPr lang="en-US" dirty="0"/>
           </a:p>
         </p:txBody>
       </p:sp>
@@ -5880,6 +5948,13 @@
   <p:clrMapOvr>
     <a:masterClrMapping/>
   </p:clrMapOvr>
+  <p:timing>
+    <p:tnLst>
+      <p:par>
+        <p:cTn id="1" dur="indefinite" restart="never" nodeType="tmRoot"/>
+      </p:par>
+    </p:tnLst>
+  </p:timing>
 </p:sld>
 </file>
 
@@ -5954,8 +6029,8 @@
         </p:blipFill>
         <p:spPr>
           <a:xfrm>
-            <a:off x="5705719" y="1825625"/>
-            <a:ext cx="5648081" cy="4601781"/>
+            <a:off x="6006905" y="1825625"/>
+            <a:ext cx="5346895" cy="4356389"/>
           </a:xfrm>
           <a:prstGeom prst="rect">
             <a:avLst/>
@@ -6039,7 +6114,7 @@
       </p:sp>
       <p:pic>
         <p:nvPicPr>
-          <p:cNvPr id="5" name="Picture 4"/>
+          <p:cNvPr id="4" name="Picture 3"/>
           <p:cNvPicPr>
             <a:picLocks noChangeAspect="1"/>
           </p:cNvPicPr>
@@ -6053,8 +6128,8 @@
         </p:blipFill>
         <p:spPr>
           <a:xfrm>
-            <a:off x="5679316" y="1825625"/>
-            <a:ext cx="5674484" cy="4657725"/>
+            <a:off x="6035040" y="1825626"/>
+            <a:ext cx="5318760" cy="4353368"/>
           </a:xfrm>
           <a:prstGeom prst="rect">
             <a:avLst/>
@@ -6138,7 +6213,7 @@
       </p:sp>
       <p:pic>
         <p:nvPicPr>
-          <p:cNvPr id="6" name="Picture 5"/>
+          <p:cNvPr id="4" name="Picture 3"/>
           <p:cNvPicPr>
             <a:picLocks noChangeAspect="1"/>
           </p:cNvPicPr>
@@ -6152,8 +6227,8 @@
         </p:blipFill>
         <p:spPr>
           <a:xfrm>
-            <a:off x="5651816" y="1825625"/>
-            <a:ext cx="5701984" cy="4600575"/>
+            <a:off x="5950634" y="1825625"/>
+            <a:ext cx="5403166" cy="4357690"/>
           </a:xfrm>
           <a:prstGeom prst="rect">
             <a:avLst/>
@@ -6170,6 +6245,13 @@
   <p:clrMapOvr>
     <a:masterClrMapping/>
   </p:clrMapOvr>
+  <p:timing>
+    <p:tnLst>
+      <p:par>
+        <p:cTn id="1" dur="indefinite" restart="never" nodeType="tmRoot"/>
+      </p:par>
+    </p:tnLst>
+  </p:timing>
 </p:sld>
 </file>
 

</xml_diff>

<commit_message>
finished report; Edited PPT
</commit_message>
<xml_diff>
--- a/finalProject_RL_8803_fall2015.pptx
+++ b/finalProject_RL_8803_fall2015.pptx
@@ -7,9 +7,13 @@
   <p:sldIdLst>
     <p:sldId id="256" r:id="rId2"/>
     <p:sldId id="260" r:id="rId3"/>
-    <p:sldId id="257" r:id="rId4"/>
-    <p:sldId id="258" r:id="rId5"/>
-    <p:sldId id="259" r:id="rId6"/>
+    <p:sldId id="261" r:id="rId4"/>
+    <p:sldId id="264" r:id="rId5"/>
+    <p:sldId id="262" r:id="rId6"/>
+    <p:sldId id="265" r:id="rId7"/>
+    <p:sldId id="263" r:id="rId8"/>
+    <p:sldId id="266" r:id="rId9"/>
+    <p:sldId id="267" r:id="rId10"/>
   </p:sldIdLst>
   <p:sldSz cx="12192000" cy="6858000"/>
   <p:notesSz cx="6858000" cy="9144000"/>
@@ -5751,10 +5755,10 @@
           <a:lstStyle/>
           <a:p>
             <a:r>
-              <a:rPr lang="en-US" sz="6000" dirty="0" smtClean="0"/>
-              <a:t>5-step Random-Walking problem</a:t>
-            </a:r>
-            <a:endParaRPr lang="en-US" sz="6000" dirty="0"/>
+              <a:rPr lang="en-US" sz="5400" dirty="0" smtClean="0"/>
+              <a:t>Solving Five-step Random-Walk Problem</a:t>
+            </a:r>
+            <a:endParaRPr lang="en-US" sz="5400" dirty="0"/>
           </a:p>
         </p:txBody>
       </p:sp>
@@ -5888,10 +5892,26 @@
           <a:lstStyle/>
           <a:p>
             <a:r>
-              <a:rPr lang="en-US" dirty="0" smtClean="0"/>
-              <a:t>5-step Random-walking</a:t>
-            </a:r>
-            <a:endParaRPr lang="en-US" dirty="0"/>
+              <a:rPr lang="en-US" dirty="0" smtClean="0">
+                <a:latin typeface="Garamond" charset="0"/>
+                <a:ea typeface="Garamond" charset="0"/>
+                <a:cs typeface="Garamond" charset="0"/>
+              </a:rPr>
+              <a:t>Five</a:t>
+            </a:r>
+            <a:r>
+              <a:rPr lang="en-US" dirty="0" smtClean="0">
+                <a:latin typeface="Garamond" charset="0"/>
+                <a:ea typeface="Garamond" charset="0"/>
+                <a:cs typeface="Garamond" charset="0"/>
+              </a:rPr>
+              <a:t>-step Random-walk</a:t>
+            </a:r>
+            <a:endParaRPr lang="en-US" dirty="0">
+              <a:latin typeface="Garamond" charset="0"/>
+              <a:ea typeface="Garamond" charset="0"/>
+              <a:cs typeface="Garamond" charset="0"/>
+            </a:endParaRPr>
           </a:p>
         </p:txBody>
       </p:sp>
@@ -5905,12 +5925,102 @@
             <p:ph idx="1"/>
           </p:nvPr>
         </p:nvSpPr>
-        <p:spPr/>
-        <p:txBody>
-          <a:bodyPr/>
-          <a:lstStyle/>
-          <a:p>
-            <a:endParaRPr lang="en-US" dirty="0"/>
+        <p:spPr>
+          <a:xfrm>
+            <a:off x="1120000" y="4005261"/>
+            <a:ext cx="10233800" cy="2171701"/>
+          </a:xfrm>
+        </p:spPr>
+        <p:txBody>
+          <a:bodyPr>
+            <a:normAutofit lnSpcReduction="10000"/>
+          </a:bodyPr>
+          <a:lstStyle/>
+          <a:p>
+            <a:r>
+              <a:rPr lang="en-US" dirty="0">
+                <a:latin typeface="Garamond" charset="0"/>
+                <a:ea typeface="Garamond" charset="0"/>
+                <a:cs typeface="Garamond" charset="0"/>
+              </a:rPr>
+              <a:t>Absorbing States: A, G, with reward of 0 and 1, respectively</a:t>
+            </a:r>
+          </a:p>
+          <a:p>
+            <a:r>
+              <a:rPr lang="en-US" dirty="0" smtClean="0">
+                <a:latin typeface="Garamond" charset="0"/>
+                <a:ea typeface="Garamond" charset="0"/>
+                <a:cs typeface="Garamond" charset="0"/>
+              </a:rPr>
+              <a:t>Markov chain of states: B, C, D, E, F. </a:t>
+            </a:r>
+          </a:p>
+          <a:p>
+            <a:pPr lvl="1"/>
+            <a:r>
+              <a:rPr lang="en-US" dirty="0" smtClean="0">
+                <a:latin typeface="Garamond" charset="0"/>
+                <a:ea typeface="Garamond" charset="0"/>
+                <a:cs typeface="Garamond" charset="0"/>
+              </a:rPr>
+              <a:t>50% chance move right or left</a:t>
+            </a:r>
+          </a:p>
+          <a:p>
+            <a:pPr lvl="1"/>
+            <a:r>
+              <a:rPr lang="en-US" dirty="0" smtClean="0">
+                <a:latin typeface="Garamond" charset="0"/>
+                <a:ea typeface="Garamond" charset="0"/>
+                <a:cs typeface="Garamond" charset="0"/>
+              </a:rPr>
+              <a:t>Ideal prediction of ending the walk at G is T = </a:t>
+            </a:r>
+            <a:r>
+              <a:rPr lang="bg-BG" dirty="0" smtClean="0">
+                <a:latin typeface="Garamond" charset="0"/>
+                <a:ea typeface="Garamond" charset="0"/>
+                <a:cs typeface="Garamond" charset="0"/>
+              </a:rPr>
+              <a:t>{1/6 </a:t>
+            </a:r>
+            <a:r>
+              <a:rPr lang="bg-BG" dirty="0">
+                <a:latin typeface="Garamond" charset="0"/>
+                <a:ea typeface="Garamond" charset="0"/>
+                <a:cs typeface="Garamond" charset="0"/>
+              </a:rPr>
+              <a:t>2/6 3/6 4/6 5/6</a:t>
+            </a:r>
+            <a:r>
+              <a:rPr lang="bg-BG" dirty="0" smtClean="0">
+                <a:latin typeface="Garamond" charset="0"/>
+                <a:ea typeface="Garamond" charset="0"/>
+                <a:cs typeface="Garamond" charset="0"/>
+              </a:rPr>
+              <a:t>}</a:t>
+            </a:r>
+            <a:endParaRPr lang="en-US" dirty="0" smtClean="0">
+              <a:latin typeface="Garamond" charset="0"/>
+              <a:ea typeface="Garamond" charset="0"/>
+              <a:cs typeface="Garamond" charset="0"/>
+            </a:endParaRPr>
+          </a:p>
+          <a:p>
+            <a:r>
+              <a:rPr lang="en-US" dirty="0" smtClean="0">
+                <a:latin typeface="Garamond" charset="0"/>
+                <a:ea typeface="Garamond" charset="0"/>
+                <a:cs typeface="Garamond" charset="0"/>
+              </a:rPr>
+              <a:t>Goal: estimate weight vector w, which is the expected values of T</a:t>
+            </a:r>
+            <a:endParaRPr lang="en-US" dirty="0">
+              <a:latin typeface="Garamond" charset="0"/>
+              <a:ea typeface="Garamond" charset="0"/>
+              <a:cs typeface="Garamond" charset="0"/>
+            </a:endParaRPr>
           </a:p>
         </p:txBody>
       </p:sp>
@@ -5931,7 +6041,7 @@
         <p:spPr>
           <a:xfrm>
             <a:off x="1289050" y="1825625"/>
-            <a:ext cx="9613900" cy="2044700"/>
+            <a:ext cx="9912350" cy="2044700"/>
           </a:xfrm>
           <a:prstGeom prst="rect">
             <a:avLst/>
@@ -5987,29 +6097,299 @@
         </p:nvSpPr>
         <p:spPr/>
         <p:txBody>
+          <a:bodyPr>
+            <a:normAutofit fontScale="90000"/>
+          </a:bodyPr>
+          <a:lstStyle/>
+          <a:p>
+            <a:r>
+              <a:rPr lang="en-US" dirty="0">
+                <a:latin typeface="Garamond" charset="0"/>
+                <a:ea typeface="Garamond" charset="0"/>
+                <a:cs typeface="Garamond" charset="0"/>
+              </a:rPr>
+              <a:t>Experiment 1 </a:t>
+            </a:r>
+            <a:r>
+              <a:rPr lang="en-US" dirty="0" smtClean="0">
+                <a:latin typeface="Garamond" charset="0"/>
+                <a:ea typeface="Garamond" charset="0"/>
+                <a:cs typeface="Garamond" charset="0"/>
+              </a:rPr>
+              <a:t>– Repeated </a:t>
+            </a:r>
+            <a:r>
+              <a:rPr lang="en-US" dirty="0">
+                <a:latin typeface="Garamond" charset="0"/>
+                <a:ea typeface="Garamond" charset="0"/>
+                <a:cs typeface="Garamond" charset="0"/>
+              </a:rPr>
+              <a:t>P</a:t>
+            </a:r>
+            <a:r>
+              <a:rPr lang="en-US" dirty="0" smtClean="0">
+                <a:latin typeface="Garamond" charset="0"/>
+                <a:ea typeface="Garamond" charset="0"/>
+                <a:cs typeface="Garamond" charset="0"/>
+              </a:rPr>
+              <a:t>resentations</a:t>
+            </a:r>
+            <a:endParaRPr lang="en-US" dirty="0">
+              <a:latin typeface="Garamond" charset="0"/>
+              <a:ea typeface="Garamond" charset="0"/>
+              <a:cs typeface="Garamond" charset="0"/>
+            </a:endParaRPr>
+          </a:p>
+        </p:txBody>
+      </p:sp>
+      <p:sp>
+        <p:nvSpPr>
+          <p:cNvPr id="5" name="Content Placeholder 4"/>
+          <p:cNvSpPr>
+            <a:spLocks noGrp="1"/>
+          </p:cNvSpPr>
+          <p:nvPr>
+            <p:ph idx="1"/>
+          </p:nvPr>
+        </p:nvSpPr>
+        <p:spPr>
+          <a:xfrm>
+            <a:off x="1120000" y="1825625"/>
+            <a:ext cx="5537975" cy="4789488"/>
+          </a:xfrm>
+        </p:spPr>
+        <p:txBody>
           <a:bodyPr/>
           <a:lstStyle/>
           <a:p>
-            <a:endParaRPr lang="en-US"/>
-          </a:p>
-        </p:txBody>
-      </p:sp>
-      <p:sp>
-        <p:nvSpPr>
-          <p:cNvPr id="5" name="Content Placeholder 4"/>
-          <p:cNvSpPr>
-            <a:spLocks noGrp="1"/>
-          </p:cNvSpPr>
-          <p:nvPr>
-            <p:ph idx="1"/>
-          </p:nvPr>
-        </p:nvSpPr>
-        <p:spPr/>
-        <p:txBody>
-          <a:bodyPr/>
-          <a:lstStyle/>
-          <a:p>
-            <a:endParaRPr lang="en-US"/>
+            <a:r>
+              <a:rPr lang="en-US" sz="2400" dirty="0" smtClean="0">
+                <a:latin typeface="Garamond" charset="0"/>
+                <a:ea typeface="Garamond" charset="0"/>
+                <a:cs typeface="Garamond" charset="0"/>
+              </a:rPr>
+              <a:t>Method and parameters:</a:t>
+            </a:r>
+          </a:p>
+          <a:p>
+            <a:pPr lvl="1"/>
+            <a:r>
+              <a:rPr lang="en-US" sz="2000" dirty="0" smtClean="0">
+                <a:latin typeface="Garamond" charset="0"/>
+                <a:ea typeface="Garamond" charset="0"/>
+                <a:cs typeface="Garamond" charset="0"/>
+              </a:rPr>
+              <a:t>Initial weight was </a:t>
+            </a:r>
+            <a:r>
+              <a:rPr lang="en-US" sz="2000" dirty="0" smtClean="0">
+                <a:latin typeface="Garamond" charset="0"/>
+                <a:ea typeface="Garamond" charset="0"/>
+                <a:cs typeface="Garamond" charset="0"/>
+              </a:rPr>
+              <a:t>set to 0.5</a:t>
+            </a:r>
+          </a:p>
+          <a:p>
+            <a:pPr lvl="1"/>
+            <a:r>
+              <a:rPr lang="en-US" sz="2000" dirty="0" smtClean="0">
+                <a:latin typeface="Garamond" charset="0"/>
+                <a:ea typeface="Garamond" charset="0"/>
+                <a:cs typeface="Garamond" charset="0"/>
+              </a:rPr>
+              <a:t>Accumulate </a:t>
+            </a:r>
+            <a:r>
+              <a:rPr lang="el-GR" sz="2000" dirty="0" smtClean="0">
+                <a:latin typeface="Garamond" charset="0"/>
+                <a:ea typeface="Garamond" charset="0"/>
+                <a:cs typeface="Garamond" charset="0"/>
+              </a:rPr>
+              <a:t>Δ</a:t>
+            </a:r>
+            <a:r>
+              <a:rPr lang="en-US" sz="2000" dirty="0" smtClean="0">
+                <a:latin typeface="Garamond" charset="0"/>
+                <a:ea typeface="Garamond" charset="0"/>
+                <a:cs typeface="Garamond" charset="0"/>
+              </a:rPr>
+              <a:t>w for sequences in a training set and update w after experiencing a whole set</a:t>
+            </a:r>
+          </a:p>
+          <a:p>
+            <a:pPr lvl="1"/>
+            <a:r>
+              <a:rPr lang="en-US" sz="2000" dirty="0" smtClean="0">
+                <a:latin typeface="Garamond" charset="0"/>
+                <a:ea typeface="Garamond" charset="0"/>
+                <a:cs typeface="Garamond" charset="0"/>
+              </a:rPr>
+              <a:t>Repeat until converge</a:t>
+            </a:r>
+          </a:p>
+          <a:p>
+            <a:pPr lvl="1"/>
+            <a:r>
+              <a:rPr lang="en-US" sz="2000" dirty="0" smtClean="0">
+                <a:latin typeface="Garamond" charset="0"/>
+                <a:ea typeface="Garamond" charset="0"/>
+                <a:cs typeface="Garamond" charset="0"/>
+              </a:rPr>
+              <a:t>Calculate mean error over 100 training sets</a:t>
+            </a:r>
+          </a:p>
+          <a:p>
+            <a:pPr lvl="1"/>
+            <a:r>
+              <a:rPr lang="el-GR" sz="2000" dirty="0" smtClean="0">
+                <a:latin typeface="Garamond" charset="0"/>
+                <a:ea typeface="Garamond" charset="0"/>
+                <a:cs typeface="Garamond" charset="0"/>
+              </a:rPr>
+              <a:t>λ</a:t>
+            </a:r>
+            <a:r>
+              <a:rPr lang="en-US" sz="2000" dirty="0" smtClean="0">
+                <a:latin typeface="Garamond" charset="0"/>
+                <a:ea typeface="Garamond" charset="0"/>
+                <a:cs typeface="Garamond" charset="0"/>
+              </a:rPr>
+              <a:t> = </a:t>
+            </a:r>
+            <a:r>
+              <a:rPr lang="pl-PL" sz="2000" dirty="0" smtClean="0">
+                <a:latin typeface="Garamond" charset="0"/>
+                <a:ea typeface="Garamond" charset="0"/>
+                <a:cs typeface="Garamond" charset="0"/>
+              </a:rPr>
+              <a:t>0.0</a:t>
+            </a:r>
+            <a:r>
+              <a:rPr lang="pl-PL" sz="2000" dirty="0">
+                <a:latin typeface="Garamond" charset="0"/>
+                <a:ea typeface="Garamond" charset="0"/>
+                <a:cs typeface="Garamond" charset="0"/>
+              </a:rPr>
+              <a:t>, 0.1, 0.3, 0.5,  0.7,  0.9, </a:t>
+            </a:r>
+            <a:r>
+              <a:rPr lang="pl-PL" sz="2000" dirty="0" smtClean="0">
+                <a:latin typeface="Garamond" charset="0"/>
+                <a:ea typeface="Garamond" charset="0"/>
+                <a:cs typeface="Garamond" charset="0"/>
+              </a:rPr>
+              <a:t>1.0; </a:t>
+            </a:r>
+            <a:r>
+              <a:rPr lang="el-GR" sz="2000" dirty="0" smtClean="0">
+                <a:latin typeface="Garamond" charset="0"/>
+                <a:ea typeface="Garamond" charset="0"/>
+                <a:cs typeface="Garamond" charset="0"/>
+              </a:rPr>
+              <a:t>α</a:t>
+            </a:r>
+            <a:r>
+              <a:rPr lang="en-US" sz="2000" dirty="0" smtClean="0">
+                <a:latin typeface="Garamond" charset="0"/>
+                <a:ea typeface="Garamond" charset="0"/>
+                <a:cs typeface="Garamond" charset="0"/>
+              </a:rPr>
+              <a:t> = 0.05; </a:t>
+            </a:r>
+            <a:r>
+              <a:rPr lang="el-GR" sz="2000" dirty="0" smtClean="0">
+                <a:latin typeface="Garamond" charset="0"/>
+                <a:ea typeface="Garamond" charset="0"/>
+                <a:cs typeface="Garamond" charset="0"/>
+              </a:rPr>
+              <a:t>ε</a:t>
+            </a:r>
+            <a:r>
+              <a:rPr lang="en-US" sz="2000" dirty="0" smtClean="0">
+                <a:latin typeface="Garamond" charset="0"/>
+                <a:ea typeface="Garamond" charset="0"/>
+                <a:cs typeface="Garamond" charset="0"/>
+              </a:rPr>
+              <a:t> = o.ooo5</a:t>
+            </a:r>
+          </a:p>
+          <a:p>
+            <a:r>
+              <a:rPr lang="en-US" sz="2400" dirty="0" smtClean="0">
+                <a:latin typeface="Garamond" charset="0"/>
+                <a:ea typeface="Garamond" charset="0"/>
+                <a:cs typeface="Garamond" charset="0"/>
+              </a:rPr>
+              <a:t>Results:</a:t>
+            </a:r>
+          </a:p>
+          <a:p>
+            <a:pPr lvl="1"/>
+            <a:r>
+              <a:rPr lang="en-US" sz="2000" dirty="0" smtClean="0">
+                <a:latin typeface="Garamond" charset="0"/>
+                <a:ea typeface="Garamond" charset="0"/>
+                <a:cs typeface="Garamond" charset="0"/>
+              </a:rPr>
+              <a:t>Error increases as </a:t>
+            </a:r>
+            <a:r>
+              <a:rPr lang="el-GR" sz="2000" dirty="0" smtClean="0">
+                <a:latin typeface="Garamond" charset="0"/>
+                <a:ea typeface="Garamond" charset="0"/>
+                <a:cs typeface="Garamond" charset="0"/>
+              </a:rPr>
+              <a:t>λ</a:t>
+            </a:r>
+            <a:r>
+              <a:rPr lang="en-US" sz="2000" dirty="0" smtClean="0">
+                <a:latin typeface="Garamond" charset="0"/>
+                <a:ea typeface="Garamond" charset="0"/>
+                <a:cs typeface="Garamond" charset="0"/>
+              </a:rPr>
+              <a:t> increases</a:t>
+            </a:r>
+          </a:p>
+          <a:p>
+            <a:pPr lvl="1"/>
+            <a:r>
+              <a:rPr lang="en-US" sz="2000" dirty="0" smtClean="0">
+                <a:latin typeface="Garamond" charset="0"/>
+                <a:ea typeface="Garamond" charset="0"/>
+                <a:cs typeface="Garamond" charset="0"/>
+              </a:rPr>
+              <a:t>Trends matches Figure 3 in Sutton’s paper</a:t>
+            </a:r>
+            <a:endParaRPr lang="en-US" sz="2000" dirty="0">
+              <a:latin typeface="Garamond" charset="0"/>
+              <a:ea typeface="Garamond" charset="0"/>
+              <a:cs typeface="Garamond" charset="0"/>
+            </a:endParaRPr>
+          </a:p>
+          <a:p>
+            <a:pPr lvl="1"/>
+            <a:endParaRPr lang="en-US" dirty="0">
+              <a:latin typeface="Garamond" charset="0"/>
+              <a:ea typeface="Garamond" charset="0"/>
+              <a:cs typeface="Garamond" charset="0"/>
+            </a:endParaRPr>
+          </a:p>
+          <a:p>
+            <a:pPr lvl="1"/>
+            <a:endParaRPr lang="en-US" dirty="0">
+              <a:latin typeface="Garamond" charset="0"/>
+              <a:ea typeface="Garamond" charset="0"/>
+              <a:cs typeface="Garamond" charset="0"/>
+            </a:endParaRPr>
+          </a:p>
+          <a:p>
+            <a:pPr lvl="1"/>
+            <a:endParaRPr lang="en-US" dirty="0">
+              <a:latin typeface="Garamond" charset="0"/>
+              <a:ea typeface="Garamond" charset="0"/>
+              <a:cs typeface="Garamond" charset="0"/>
+            </a:endParaRPr>
           </a:p>
         </p:txBody>
       </p:sp>
@@ -6029,18 +6409,65 @@
         </p:blipFill>
         <p:spPr>
           <a:xfrm>
-            <a:off x="6006905" y="1825625"/>
-            <a:ext cx="5346895" cy="4356389"/>
+            <a:off x="6772275" y="1825625"/>
+            <a:ext cx="4581525" cy="3732803"/>
           </a:xfrm>
           <a:prstGeom prst="rect">
             <a:avLst/>
           </a:prstGeom>
         </p:spPr>
       </p:pic>
+      <p:sp>
+        <p:nvSpPr>
+          <p:cNvPr id="6" name="TextBox 5"/>
+          <p:cNvSpPr txBox="1"/>
+          <p:nvPr/>
+        </p:nvSpPr>
+        <p:spPr>
+          <a:xfrm>
+            <a:off x="6772275" y="5693365"/>
+            <a:ext cx="4581526" cy="307777"/>
+          </a:xfrm>
+          <a:prstGeom prst="rect">
+            <a:avLst/>
+          </a:prstGeom>
+          <a:noFill/>
+        </p:spPr>
+        <p:txBody>
+          <a:bodyPr wrap="square" rtlCol="0">
+            <a:spAutoFit/>
+          </a:bodyPr>
+          <a:lstStyle/>
+          <a:p>
+            <a:pPr algn="ctr"/>
+            <a:r>
+              <a:rPr lang="en-US" sz="1400" dirty="0">
+                <a:latin typeface="Garamond" charset="0"/>
+                <a:ea typeface="Garamond" charset="0"/>
+                <a:cs typeface="Garamond" charset="0"/>
+              </a:rPr>
+              <a:t>Average error on the random-walk </a:t>
+            </a:r>
+            <a:r>
+              <a:rPr lang="en-US" sz="1400" dirty="0" smtClean="0">
+                <a:latin typeface="Garamond" charset="0"/>
+                <a:ea typeface="Garamond" charset="0"/>
+                <a:cs typeface="Garamond" charset="0"/>
+              </a:rPr>
+              <a:t>problem</a:t>
+            </a:r>
+            <a:endParaRPr lang="en-US" sz="1400" dirty="0">
+              <a:latin typeface="Garamond" charset="0"/>
+              <a:ea typeface="Garamond" charset="0"/>
+              <a:cs typeface="Garamond" charset="0"/>
+            </a:endParaRPr>
+          </a:p>
+        </p:txBody>
+      </p:sp>
     </p:spTree>
     <p:extLst>
       <p:ext uri="{BB962C8B-B14F-4D97-AF65-F5344CB8AC3E}">
-        <p14:creationId xmlns:p14="http://schemas.microsoft.com/office/powerpoint/2010/main" val="85861005"/>
+        <p14:creationId xmlns:p14="http://schemas.microsoft.com/office/powerpoint/2010/main" val="1121545747"/>
       </p:ext>
     </p:extLst>
   </p:cSld>
@@ -6086,35 +6513,57 @@
         </p:nvSpPr>
         <p:spPr/>
         <p:txBody>
+          <a:bodyPr>
+            <a:normAutofit fontScale="90000"/>
+          </a:bodyPr>
+          <a:lstStyle/>
+          <a:p>
+            <a:r>
+              <a:rPr lang="en-US" dirty="0">
+                <a:latin typeface="Garamond" charset="0"/>
+                <a:ea typeface="Garamond" charset="0"/>
+                <a:cs typeface="Garamond" charset="0"/>
+              </a:rPr>
+              <a:t>Experiment 1 </a:t>
+            </a:r>
+            <a:r>
+              <a:rPr lang="en-US" dirty="0" smtClean="0">
+                <a:latin typeface="Garamond" charset="0"/>
+                <a:ea typeface="Garamond" charset="0"/>
+                <a:cs typeface="Garamond" charset="0"/>
+              </a:rPr>
+              <a:t>– Repeated Presentations</a:t>
+            </a:r>
+            <a:endParaRPr lang="en-US" dirty="0">
+              <a:latin typeface="Garamond" charset="0"/>
+              <a:ea typeface="Garamond" charset="0"/>
+              <a:cs typeface="Garamond" charset="0"/>
+            </a:endParaRPr>
+          </a:p>
+        </p:txBody>
+      </p:sp>
+      <p:sp>
+        <p:nvSpPr>
+          <p:cNvPr id="5" name="Content Placeholder 4"/>
+          <p:cNvSpPr>
+            <a:spLocks noGrp="1"/>
+          </p:cNvSpPr>
+          <p:nvPr>
+            <p:ph idx="1"/>
+          </p:nvPr>
+        </p:nvSpPr>
+        <p:spPr/>
+        <p:txBody>
           <a:bodyPr/>
           <a:lstStyle/>
           <a:p>
-            <a:endParaRPr lang="en-US"/>
-          </a:p>
-        </p:txBody>
-      </p:sp>
-      <p:sp>
-        <p:nvSpPr>
-          <p:cNvPr id="3" name="Content Placeholder 2"/>
-          <p:cNvSpPr>
-            <a:spLocks noGrp="1"/>
-          </p:cNvSpPr>
-          <p:nvPr>
-            <p:ph idx="1"/>
-          </p:nvPr>
-        </p:nvSpPr>
-        <p:spPr/>
-        <p:txBody>
-          <a:bodyPr/>
-          <a:lstStyle/>
-          <a:p>
-            <a:endParaRPr lang="en-US"/>
+            <a:endParaRPr lang="en-US" dirty="0"/>
           </a:p>
         </p:txBody>
       </p:sp>
       <p:pic>
         <p:nvPicPr>
-          <p:cNvPr id="4" name="Picture 3"/>
+          <p:cNvPr id="7" name="Picture 6"/>
           <p:cNvPicPr>
             <a:picLocks noChangeAspect="1"/>
           </p:cNvPicPr>
@@ -6128,18 +6577,89 @@
         </p:blipFill>
         <p:spPr>
           <a:xfrm>
-            <a:off x="6035040" y="1825626"/>
-            <a:ext cx="5318760" cy="4353368"/>
+            <a:off x="6772275" y="1825625"/>
+            <a:ext cx="4581525" cy="3732803"/>
           </a:xfrm>
           <a:prstGeom prst="rect">
             <a:avLst/>
           </a:prstGeom>
         </p:spPr>
       </p:pic>
+      <p:pic>
+        <p:nvPicPr>
+          <p:cNvPr id="4" name="Picture 3"/>
+          <p:cNvPicPr>
+            <a:picLocks noChangeAspect="1"/>
+          </p:cNvPicPr>
+          <p:nvPr/>
+        </p:nvPicPr>
+        <p:blipFill>
+          <a:blip r:embed="rId3"/>
+          <a:stretch>
+            <a:fillRect/>
+          </a:stretch>
+        </p:blipFill>
+        <p:spPr>
+          <a:xfrm>
+            <a:off x="1120001" y="1825625"/>
+            <a:ext cx="4252100" cy="3727373"/>
+          </a:xfrm>
+          <a:prstGeom prst="rect">
+            <a:avLst/>
+          </a:prstGeom>
+        </p:spPr>
+      </p:pic>
+      <p:sp>
+        <p:nvSpPr>
+          <p:cNvPr id="6" name="TextBox 5"/>
+          <p:cNvSpPr txBox="1"/>
+          <p:nvPr/>
+        </p:nvSpPr>
+        <p:spPr>
+          <a:xfrm>
+            <a:off x="6772275" y="5693365"/>
+            <a:ext cx="4581526" cy="307777"/>
+          </a:xfrm>
+          <a:prstGeom prst="rect">
+            <a:avLst/>
+          </a:prstGeom>
+          <a:noFill/>
+        </p:spPr>
+        <p:txBody>
+          <a:bodyPr wrap="square" rtlCol="0">
+            <a:spAutoFit/>
+          </a:bodyPr>
+          <a:lstStyle/>
+          <a:p>
+            <a:pPr algn="ctr"/>
+            <a:r>
+              <a:rPr lang="en-US" sz="1400" dirty="0">
+                <a:latin typeface="Garamond" charset="0"/>
+                <a:ea typeface="Garamond" charset="0"/>
+                <a:cs typeface="Garamond" charset="0"/>
+              </a:rPr>
+              <a:t>Average error on the random-walk </a:t>
+            </a:r>
+            <a:r>
+              <a:rPr lang="en-US" sz="1400" dirty="0" smtClean="0">
+                <a:latin typeface="Garamond" charset="0"/>
+                <a:ea typeface="Garamond" charset="0"/>
+                <a:cs typeface="Garamond" charset="0"/>
+              </a:rPr>
+              <a:t>problem</a:t>
+            </a:r>
+            <a:endParaRPr lang="en-US" sz="1400" dirty="0">
+              <a:latin typeface="Garamond" charset="0"/>
+              <a:ea typeface="Garamond" charset="0"/>
+              <a:cs typeface="Garamond" charset="0"/>
+            </a:endParaRPr>
+          </a:p>
+        </p:txBody>
+      </p:sp>
     </p:spTree>
     <p:extLst>
       <p:ext uri="{BB962C8B-B14F-4D97-AF65-F5344CB8AC3E}">
-        <p14:creationId xmlns:p14="http://schemas.microsoft.com/office/powerpoint/2010/main" val="745207661"/>
+        <p14:creationId xmlns:p14="http://schemas.microsoft.com/office/powerpoint/2010/main" val="220031649"/>
       </p:ext>
     </p:extLst>
   </p:cSld>
@@ -6185,29 +6705,40 @@
         </p:nvSpPr>
         <p:spPr/>
         <p:txBody>
-          <a:bodyPr/>
-          <a:lstStyle/>
-          <a:p>
-            <a:endParaRPr lang="en-US"/>
-          </a:p>
-        </p:txBody>
-      </p:sp>
-      <p:sp>
-        <p:nvSpPr>
-          <p:cNvPr id="3" name="Content Placeholder 2"/>
-          <p:cNvSpPr>
-            <a:spLocks noGrp="1"/>
-          </p:cNvSpPr>
-          <p:nvPr>
-            <p:ph idx="1"/>
-          </p:nvPr>
-        </p:nvSpPr>
-        <p:spPr/>
-        <p:txBody>
-          <a:bodyPr/>
-          <a:lstStyle/>
-          <a:p>
-            <a:endParaRPr lang="en-US" dirty="0"/>
+          <a:bodyPr>
+            <a:normAutofit fontScale="90000"/>
+          </a:bodyPr>
+          <a:lstStyle/>
+          <a:p>
+            <a:r>
+              <a:rPr lang="en-US" dirty="0">
+                <a:latin typeface="Garamond" charset="0"/>
+                <a:ea typeface="Garamond" charset="0"/>
+                <a:cs typeface="Garamond" charset="0"/>
+              </a:rPr>
+              <a:t>Experiment </a:t>
+            </a:r>
+            <a:r>
+              <a:rPr lang="en-US" dirty="0" smtClean="0">
+                <a:latin typeface="Garamond" charset="0"/>
+                <a:ea typeface="Garamond" charset="0"/>
+                <a:cs typeface="Garamond" charset="0"/>
+              </a:rPr>
+              <a:t>2 - Experiencing </a:t>
+            </a:r>
+            <a:r>
+              <a:rPr lang="en-US" dirty="0">
+                <a:latin typeface="Garamond" charset="0"/>
+                <a:ea typeface="Garamond" charset="0"/>
+                <a:cs typeface="Garamond" charset="0"/>
+              </a:rPr>
+              <a:t>10 sequences</a:t>
+            </a:r>
+            <a:endParaRPr lang="en-US" dirty="0">
+              <a:latin typeface="Garamond" charset="0"/>
+              <a:ea typeface="Garamond" charset="0"/>
+              <a:cs typeface="Garamond" charset="0"/>
+            </a:endParaRPr>
           </a:p>
         </p:txBody>
       </p:sp>
@@ -6227,18 +6758,490 @@
         </p:blipFill>
         <p:spPr>
           <a:xfrm>
-            <a:off x="5950634" y="1825625"/>
-            <a:ext cx="5403166" cy="4357690"/>
+            <a:off x="6772274" y="1825626"/>
+            <a:ext cx="4581525" cy="3749946"/>
           </a:xfrm>
           <a:prstGeom prst="rect">
             <a:avLst/>
           </a:prstGeom>
         </p:spPr>
       </p:pic>
+      <p:sp>
+        <p:nvSpPr>
+          <p:cNvPr id="7" name="Content Placeholder 4"/>
+          <p:cNvSpPr>
+            <a:spLocks noGrp="1"/>
+          </p:cNvSpPr>
+          <p:nvPr>
+            <p:ph idx="1"/>
+          </p:nvPr>
+        </p:nvSpPr>
+        <p:spPr>
+          <a:xfrm>
+            <a:off x="1120000" y="1825625"/>
+            <a:ext cx="5537975" cy="4789488"/>
+          </a:xfrm>
+        </p:spPr>
+        <p:txBody>
+          <a:bodyPr/>
+          <a:lstStyle/>
+          <a:p>
+            <a:r>
+              <a:rPr lang="en-US" sz="2400" dirty="0" smtClean="0">
+                <a:latin typeface="Garamond" charset="0"/>
+                <a:ea typeface="Garamond" charset="0"/>
+                <a:cs typeface="Garamond" charset="0"/>
+              </a:rPr>
+              <a:t>Method and parameters:</a:t>
+            </a:r>
+          </a:p>
+          <a:p>
+            <a:pPr lvl="1"/>
+            <a:r>
+              <a:rPr lang="en-US" sz="2000" dirty="0" smtClean="0">
+                <a:latin typeface="Garamond" charset="0"/>
+                <a:ea typeface="Garamond" charset="0"/>
+                <a:cs typeface="Garamond" charset="0"/>
+              </a:rPr>
+              <a:t>Initial weight was </a:t>
+            </a:r>
+            <a:r>
+              <a:rPr lang="en-US" sz="2000" dirty="0" smtClean="0">
+                <a:latin typeface="Garamond" charset="0"/>
+                <a:ea typeface="Garamond" charset="0"/>
+                <a:cs typeface="Garamond" charset="0"/>
+              </a:rPr>
+              <a:t>set to 0.5</a:t>
+            </a:r>
+          </a:p>
+          <a:p>
+            <a:pPr lvl="1"/>
+            <a:r>
+              <a:rPr lang="en-US" sz="2000" dirty="0" smtClean="0">
+                <a:latin typeface="Garamond" charset="0"/>
+                <a:ea typeface="Garamond" charset="0"/>
+                <a:cs typeface="Garamond" charset="0"/>
+              </a:rPr>
+              <a:t>Only train on data once</a:t>
+            </a:r>
+          </a:p>
+          <a:p>
+            <a:pPr lvl="1"/>
+            <a:r>
+              <a:rPr lang="en-US" sz="2000" dirty="0" smtClean="0">
+                <a:latin typeface="Garamond" charset="0"/>
+                <a:ea typeface="Garamond" charset="0"/>
+                <a:cs typeface="Garamond" charset="0"/>
+              </a:rPr>
+              <a:t>Update w after experiencing each sequences</a:t>
+            </a:r>
+          </a:p>
+          <a:p>
+            <a:pPr lvl="1"/>
+            <a:r>
+              <a:rPr lang="en-US" sz="2000" dirty="0" smtClean="0">
+                <a:latin typeface="Garamond" charset="0"/>
+                <a:ea typeface="Garamond" charset="0"/>
+                <a:cs typeface="Garamond" charset="0"/>
+              </a:rPr>
+              <a:t>Calculate mean error over 100 training sets</a:t>
+            </a:r>
+          </a:p>
+          <a:p>
+            <a:pPr lvl="1"/>
+            <a:r>
+              <a:rPr lang="el-GR" sz="2000" dirty="0" smtClean="0">
+                <a:latin typeface="Garamond" charset="0"/>
+                <a:ea typeface="Garamond" charset="0"/>
+                <a:cs typeface="Garamond" charset="0"/>
+              </a:rPr>
+              <a:t>λ</a:t>
+            </a:r>
+            <a:r>
+              <a:rPr lang="en-US" sz="2000" dirty="0" smtClean="0">
+                <a:latin typeface="Garamond" charset="0"/>
+                <a:ea typeface="Garamond" charset="0"/>
+                <a:cs typeface="Garamond" charset="0"/>
+              </a:rPr>
+              <a:t> = </a:t>
+            </a:r>
+            <a:r>
+              <a:rPr lang="nb-NO" sz="2000" dirty="0" smtClean="0">
+                <a:latin typeface="Garamond" charset="0"/>
+                <a:ea typeface="Garamond" charset="0"/>
+                <a:cs typeface="Garamond" charset="0"/>
+              </a:rPr>
+              <a:t>.</a:t>
+            </a:r>
+            <a:r>
+              <a:rPr lang="nb-NO" sz="2000" dirty="0">
+                <a:latin typeface="Garamond" charset="0"/>
+                <a:ea typeface="Garamond" charset="0"/>
+                <a:cs typeface="Garamond" charset="0"/>
+              </a:rPr>
+              <a:t>0</a:t>
+            </a:r>
+            <a:r>
+              <a:rPr lang="nb-NO" sz="2000" dirty="0" smtClean="0">
+                <a:latin typeface="Garamond" charset="0"/>
+                <a:ea typeface="Garamond" charset="0"/>
+                <a:cs typeface="Garamond" charset="0"/>
+              </a:rPr>
+              <a:t>, .</a:t>
+            </a:r>
+            <a:r>
+              <a:rPr lang="nb-NO" sz="2000" dirty="0">
+                <a:latin typeface="Garamond" charset="0"/>
+                <a:ea typeface="Garamond" charset="0"/>
+                <a:cs typeface="Garamond" charset="0"/>
+              </a:rPr>
+              <a:t>1</a:t>
+            </a:r>
+            <a:r>
+              <a:rPr lang="nb-NO" sz="2000" dirty="0" smtClean="0">
+                <a:latin typeface="Garamond" charset="0"/>
+                <a:ea typeface="Garamond" charset="0"/>
+                <a:cs typeface="Garamond" charset="0"/>
+              </a:rPr>
+              <a:t>, .2, .</a:t>
+            </a:r>
+            <a:r>
+              <a:rPr lang="nb-NO" sz="2000" dirty="0">
+                <a:latin typeface="Garamond" charset="0"/>
+                <a:ea typeface="Garamond" charset="0"/>
+                <a:cs typeface="Garamond" charset="0"/>
+              </a:rPr>
+              <a:t>3</a:t>
+            </a:r>
+            <a:r>
+              <a:rPr lang="nb-NO" sz="2000" dirty="0" smtClean="0">
+                <a:latin typeface="Garamond" charset="0"/>
+                <a:ea typeface="Garamond" charset="0"/>
+                <a:cs typeface="Garamond" charset="0"/>
+              </a:rPr>
+              <a:t>, .</a:t>
+            </a:r>
+            <a:r>
+              <a:rPr lang="nb-NO" sz="2000" dirty="0">
+                <a:latin typeface="Garamond" charset="0"/>
+                <a:ea typeface="Garamond" charset="0"/>
+                <a:cs typeface="Garamond" charset="0"/>
+              </a:rPr>
+              <a:t>4</a:t>
+            </a:r>
+            <a:r>
+              <a:rPr lang="nb-NO" sz="2000" dirty="0" smtClean="0">
+                <a:latin typeface="Garamond" charset="0"/>
+                <a:ea typeface="Garamond" charset="0"/>
+                <a:cs typeface="Garamond" charset="0"/>
+              </a:rPr>
+              <a:t>, .</a:t>
+            </a:r>
+            <a:r>
+              <a:rPr lang="nb-NO" sz="2000" dirty="0">
+                <a:latin typeface="Garamond" charset="0"/>
+                <a:ea typeface="Garamond" charset="0"/>
+                <a:cs typeface="Garamond" charset="0"/>
+              </a:rPr>
+              <a:t>5</a:t>
+            </a:r>
+            <a:r>
+              <a:rPr lang="nb-NO" sz="2000" dirty="0" smtClean="0">
+                <a:latin typeface="Garamond" charset="0"/>
+                <a:ea typeface="Garamond" charset="0"/>
+                <a:cs typeface="Garamond" charset="0"/>
+              </a:rPr>
+              <a:t>, .</a:t>
+            </a:r>
+            <a:r>
+              <a:rPr lang="nb-NO" sz="2000" dirty="0">
+                <a:latin typeface="Garamond" charset="0"/>
+                <a:ea typeface="Garamond" charset="0"/>
+                <a:cs typeface="Garamond" charset="0"/>
+              </a:rPr>
+              <a:t>6</a:t>
+            </a:r>
+            <a:r>
+              <a:rPr lang="nb-NO" sz="2000" dirty="0" smtClean="0">
+                <a:latin typeface="Garamond" charset="0"/>
+                <a:ea typeface="Garamond" charset="0"/>
+                <a:cs typeface="Garamond" charset="0"/>
+              </a:rPr>
+              <a:t>, .</a:t>
+            </a:r>
+            <a:r>
+              <a:rPr lang="nb-NO" sz="2000" dirty="0">
+                <a:latin typeface="Garamond" charset="0"/>
+                <a:ea typeface="Garamond" charset="0"/>
+                <a:cs typeface="Garamond" charset="0"/>
+              </a:rPr>
+              <a:t>7</a:t>
+            </a:r>
+            <a:r>
+              <a:rPr lang="nb-NO" sz="2000" dirty="0" smtClean="0">
+                <a:latin typeface="Garamond" charset="0"/>
+                <a:ea typeface="Garamond" charset="0"/>
+                <a:cs typeface="Garamond" charset="0"/>
+              </a:rPr>
+              <a:t>, .</a:t>
+            </a:r>
+            <a:r>
+              <a:rPr lang="nb-NO" sz="2000" dirty="0">
+                <a:latin typeface="Garamond" charset="0"/>
+                <a:ea typeface="Garamond" charset="0"/>
+                <a:cs typeface="Garamond" charset="0"/>
+              </a:rPr>
+              <a:t>8</a:t>
+            </a:r>
+            <a:r>
+              <a:rPr lang="nb-NO" sz="2000" dirty="0" smtClean="0">
+                <a:latin typeface="Garamond" charset="0"/>
+                <a:ea typeface="Garamond" charset="0"/>
+                <a:cs typeface="Garamond" charset="0"/>
+              </a:rPr>
+              <a:t>, .9, 1.0</a:t>
+            </a:r>
+          </a:p>
+          <a:p>
+            <a:pPr lvl="1"/>
+            <a:r>
+              <a:rPr lang="el-GR" sz="2000" dirty="0" smtClean="0">
+                <a:latin typeface="Garamond" charset="0"/>
+                <a:ea typeface="Garamond" charset="0"/>
+                <a:cs typeface="Garamond" charset="0"/>
+              </a:rPr>
+              <a:t>α</a:t>
+            </a:r>
+            <a:r>
+              <a:rPr lang="en-US" sz="2000" dirty="0" smtClean="0">
+                <a:latin typeface="Garamond" charset="0"/>
+                <a:ea typeface="Garamond" charset="0"/>
+                <a:cs typeface="Garamond" charset="0"/>
+              </a:rPr>
+              <a:t> = </a:t>
+            </a:r>
+            <a:r>
+              <a:rPr lang="it-IT" sz="2000" dirty="0" smtClean="0">
+                <a:latin typeface="Garamond" charset="0"/>
+                <a:ea typeface="Garamond" charset="0"/>
+                <a:cs typeface="Garamond" charset="0"/>
+              </a:rPr>
+              <a:t>0.0</a:t>
+            </a:r>
+            <a:r>
+              <a:rPr lang="it-IT" sz="2000" dirty="0">
+                <a:latin typeface="Garamond" charset="0"/>
+                <a:ea typeface="Garamond" charset="0"/>
+                <a:cs typeface="Garamond" charset="0"/>
+              </a:rPr>
+              <a:t>, 0.05, 0.1, </a:t>
+            </a:r>
+            <a:r>
+              <a:rPr lang="it-IT" sz="2000" dirty="0" smtClean="0">
+                <a:latin typeface="Garamond" charset="0"/>
+                <a:ea typeface="Garamond" charset="0"/>
+                <a:cs typeface="Garamond" charset="0"/>
+              </a:rPr>
+              <a:t>0.15</a:t>
+            </a:r>
+            <a:r>
+              <a:rPr lang="en-US" sz="2000" dirty="0" smtClean="0">
+                <a:latin typeface="Garamond" charset="0"/>
+                <a:ea typeface="Garamond" charset="0"/>
+                <a:cs typeface="Garamond" charset="0"/>
+              </a:rPr>
+              <a:t>,</a:t>
+            </a:r>
+            <a:r>
+              <a:rPr lang="is-IS" sz="2000" dirty="0" smtClean="0">
+                <a:latin typeface="Garamond" charset="0"/>
+                <a:ea typeface="Garamond" charset="0"/>
+                <a:cs typeface="Garamond" charset="0"/>
+              </a:rPr>
+              <a:t>….,</a:t>
+            </a:r>
+            <a:r>
+              <a:rPr lang="it-IT" sz="2000" dirty="0" smtClean="0">
+                <a:latin typeface="Garamond" charset="0"/>
+                <a:ea typeface="Garamond" charset="0"/>
+                <a:cs typeface="Garamond" charset="0"/>
+              </a:rPr>
+              <a:t> </a:t>
+            </a:r>
+            <a:r>
+              <a:rPr lang="it-IT" sz="2000" dirty="0">
+                <a:latin typeface="Garamond" charset="0"/>
+                <a:ea typeface="Garamond" charset="0"/>
+                <a:cs typeface="Garamond" charset="0"/>
+              </a:rPr>
+              <a:t>0.55, </a:t>
+            </a:r>
+            <a:r>
+              <a:rPr lang="it-IT" sz="2000" dirty="0" smtClean="0">
+                <a:latin typeface="Garamond" charset="0"/>
+                <a:ea typeface="Garamond" charset="0"/>
+                <a:cs typeface="Garamond" charset="0"/>
+              </a:rPr>
+              <a:t>0.6</a:t>
+            </a:r>
+            <a:endParaRPr lang="en-US" sz="2000" dirty="0" smtClean="0">
+              <a:latin typeface="Garamond" charset="0"/>
+              <a:ea typeface="Garamond" charset="0"/>
+              <a:cs typeface="Garamond" charset="0"/>
+            </a:endParaRPr>
+          </a:p>
+          <a:p>
+            <a:r>
+              <a:rPr lang="en-US" sz="2400" dirty="0" smtClean="0">
+                <a:latin typeface="Garamond" charset="0"/>
+                <a:ea typeface="Garamond" charset="0"/>
+                <a:cs typeface="Garamond" charset="0"/>
+              </a:rPr>
+              <a:t>Results:</a:t>
+            </a:r>
+          </a:p>
+          <a:p>
+            <a:pPr lvl="1"/>
+            <a:r>
+              <a:rPr lang="en-US" sz="2000" dirty="0" smtClean="0">
+                <a:latin typeface="Garamond" charset="0"/>
+                <a:ea typeface="Garamond" charset="0"/>
+                <a:cs typeface="Garamond" charset="0"/>
+              </a:rPr>
+              <a:t>Learning rates affect performance</a:t>
+            </a:r>
+          </a:p>
+          <a:p>
+            <a:pPr lvl="1"/>
+            <a:r>
+              <a:rPr lang="en-US" sz="2000" dirty="0" smtClean="0">
+                <a:latin typeface="Garamond" charset="0"/>
+                <a:ea typeface="Garamond" charset="0"/>
+                <a:cs typeface="Garamond" charset="0"/>
+              </a:rPr>
+              <a:t>TD(1) performed worst under different values of </a:t>
+            </a:r>
+            <a:r>
+              <a:rPr lang="el-GR" sz="2000" dirty="0" smtClean="0">
+                <a:latin typeface="Garamond" charset="0"/>
+                <a:ea typeface="Garamond" charset="0"/>
+                <a:cs typeface="Garamond" charset="0"/>
+              </a:rPr>
+              <a:t>α</a:t>
+            </a:r>
+            <a:endParaRPr lang="en-US" sz="2000" dirty="0" smtClean="0">
+              <a:latin typeface="Garamond" charset="0"/>
+              <a:ea typeface="Garamond" charset="0"/>
+              <a:cs typeface="Garamond" charset="0"/>
+            </a:endParaRPr>
+          </a:p>
+          <a:p>
+            <a:pPr lvl="1"/>
+            <a:r>
+              <a:rPr lang="en-US" sz="2000" dirty="0" smtClean="0">
+                <a:latin typeface="Garamond" charset="0"/>
+                <a:ea typeface="Garamond" charset="0"/>
+                <a:cs typeface="Garamond" charset="0"/>
+              </a:rPr>
+              <a:t>TD(0)’s error increase rapidly for a &gt; 0.4</a:t>
+            </a:r>
+          </a:p>
+          <a:p>
+            <a:pPr lvl="1"/>
+            <a:r>
+              <a:rPr lang="en-US" sz="2000" dirty="0" smtClean="0">
+                <a:latin typeface="Garamond" charset="0"/>
+                <a:ea typeface="Garamond" charset="0"/>
+                <a:cs typeface="Garamond" charset="0"/>
+              </a:rPr>
+              <a:t>Trends matches Figure 4 in Sutton’s paper</a:t>
+            </a:r>
+            <a:endParaRPr lang="en-US" sz="2000" dirty="0">
+              <a:latin typeface="Garamond" charset="0"/>
+              <a:ea typeface="Garamond" charset="0"/>
+              <a:cs typeface="Garamond" charset="0"/>
+            </a:endParaRPr>
+          </a:p>
+          <a:p>
+            <a:pPr lvl="1"/>
+            <a:endParaRPr lang="en-US" dirty="0">
+              <a:latin typeface="Garamond" charset="0"/>
+              <a:ea typeface="Garamond" charset="0"/>
+              <a:cs typeface="Garamond" charset="0"/>
+            </a:endParaRPr>
+          </a:p>
+          <a:p>
+            <a:pPr lvl="1"/>
+            <a:endParaRPr lang="en-US" dirty="0">
+              <a:latin typeface="Garamond" charset="0"/>
+              <a:ea typeface="Garamond" charset="0"/>
+              <a:cs typeface="Garamond" charset="0"/>
+            </a:endParaRPr>
+          </a:p>
+          <a:p>
+            <a:pPr lvl="1"/>
+            <a:endParaRPr lang="en-US" dirty="0">
+              <a:latin typeface="Garamond" charset="0"/>
+              <a:ea typeface="Garamond" charset="0"/>
+              <a:cs typeface="Garamond" charset="0"/>
+            </a:endParaRPr>
+          </a:p>
+        </p:txBody>
+      </p:sp>
+      <p:sp>
+        <p:nvSpPr>
+          <p:cNvPr id="8" name="TextBox 7"/>
+          <p:cNvSpPr txBox="1"/>
+          <p:nvPr/>
+        </p:nvSpPr>
+        <p:spPr>
+          <a:xfrm>
+            <a:off x="6772275" y="5693365"/>
+            <a:ext cx="4581526" cy="307777"/>
+          </a:xfrm>
+          <a:prstGeom prst="rect">
+            <a:avLst/>
+          </a:prstGeom>
+          <a:noFill/>
+        </p:spPr>
+        <p:txBody>
+          <a:bodyPr wrap="square" rtlCol="0">
+            <a:spAutoFit/>
+          </a:bodyPr>
+          <a:lstStyle/>
+          <a:p>
+            <a:pPr algn="ctr"/>
+            <a:r>
+              <a:rPr lang="en-US" sz="1400" dirty="0">
+                <a:latin typeface="Garamond" charset="0"/>
+                <a:ea typeface="Garamond" charset="0"/>
+                <a:cs typeface="Garamond" charset="0"/>
+              </a:rPr>
+              <a:t>Average error on random walk problem after </a:t>
+            </a:r>
+            <a:r>
+              <a:rPr lang="en-US" sz="1400" dirty="0" smtClean="0">
+                <a:latin typeface="Garamond" charset="0"/>
+                <a:ea typeface="Garamond" charset="0"/>
+                <a:cs typeface="Garamond" charset="0"/>
+              </a:rPr>
+              <a:t>10 </a:t>
+            </a:r>
+            <a:r>
+              <a:rPr lang="en-US" sz="1400" dirty="0">
+                <a:latin typeface="Garamond" charset="0"/>
+                <a:ea typeface="Garamond" charset="0"/>
+                <a:cs typeface="Garamond" charset="0"/>
+              </a:rPr>
+              <a:t>sequences</a:t>
+            </a:r>
+          </a:p>
+        </p:txBody>
+      </p:sp>
     </p:spTree>
     <p:extLst>
       <p:ext uri="{BB962C8B-B14F-4D97-AF65-F5344CB8AC3E}">
-        <p14:creationId xmlns:p14="http://schemas.microsoft.com/office/powerpoint/2010/main" val="152896026"/>
+        <p14:creationId xmlns:p14="http://schemas.microsoft.com/office/powerpoint/2010/main" val="1355400110"/>
       </p:ext>
     </p:extLst>
   </p:cSld>
@@ -6252,6 +7255,853 @@
       </p:par>
     </p:tnLst>
   </p:timing>
+</p:sld>
+</file>
+
+<file path=ppt/slides/slide6.xml><?xml version="1.0" encoding="utf-8"?>
+<p:sld xmlns:a="http://schemas.openxmlformats.org/drawingml/2006/main" xmlns:r="http://schemas.openxmlformats.org/officeDocument/2006/relationships" xmlns:p="http://schemas.openxmlformats.org/presentationml/2006/main">
+  <p:cSld>
+    <p:spTree>
+      <p:nvGrpSpPr>
+        <p:cNvPr id="1" name=""/>
+        <p:cNvGrpSpPr/>
+        <p:nvPr/>
+      </p:nvGrpSpPr>
+      <p:grpSpPr>
+        <a:xfrm>
+          <a:off x="0" y="0"/>
+          <a:ext cx="0" cy="0"/>
+          <a:chOff x="0" y="0"/>
+          <a:chExt cx="0" cy="0"/>
+        </a:xfrm>
+      </p:grpSpPr>
+      <p:sp>
+        <p:nvSpPr>
+          <p:cNvPr id="2" name="Title 1"/>
+          <p:cNvSpPr>
+            <a:spLocks noGrp="1"/>
+          </p:cNvSpPr>
+          <p:nvPr>
+            <p:ph type="title"/>
+          </p:nvPr>
+        </p:nvSpPr>
+        <p:spPr/>
+        <p:txBody>
+          <a:bodyPr>
+            <a:normAutofit fontScale="90000"/>
+          </a:bodyPr>
+          <a:lstStyle/>
+          <a:p>
+            <a:r>
+              <a:rPr lang="en-US" dirty="0">
+                <a:latin typeface="Garamond" charset="0"/>
+                <a:ea typeface="Garamond" charset="0"/>
+                <a:cs typeface="Garamond" charset="0"/>
+              </a:rPr>
+              <a:t>Experiment 2 - Experiencing 10 sequences</a:t>
+            </a:r>
+            <a:endParaRPr lang="en-US" dirty="0"/>
+          </a:p>
+        </p:txBody>
+      </p:sp>
+      <p:sp>
+        <p:nvSpPr>
+          <p:cNvPr id="3" name="Content Placeholder 2"/>
+          <p:cNvSpPr>
+            <a:spLocks noGrp="1"/>
+          </p:cNvSpPr>
+          <p:nvPr>
+            <p:ph idx="1"/>
+          </p:nvPr>
+        </p:nvSpPr>
+        <p:spPr/>
+        <p:txBody>
+          <a:bodyPr/>
+          <a:lstStyle/>
+          <a:p>
+            <a:endParaRPr lang="en-US"/>
+          </a:p>
+        </p:txBody>
+      </p:sp>
+      <p:pic>
+        <p:nvPicPr>
+          <p:cNvPr id="4" name="Picture 3"/>
+          <p:cNvPicPr>
+            <a:picLocks noChangeAspect="1"/>
+          </p:cNvPicPr>
+          <p:nvPr/>
+        </p:nvPicPr>
+        <p:blipFill>
+          <a:blip r:embed="rId2"/>
+          <a:stretch>
+            <a:fillRect/>
+          </a:stretch>
+        </p:blipFill>
+        <p:spPr>
+          <a:xfrm>
+            <a:off x="6772274" y="1825626"/>
+            <a:ext cx="4581525" cy="3749946"/>
+          </a:xfrm>
+          <a:prstGeom prst="rect">
+            <a:avLst/>
+          </a:prstGeom>
+        </p:spPr>
+      </p:pic>
+      <p:pic>
+        <p:nvPicPr>
+          <p:cNvPr id="5" name="Picture 4"/>
+          <p:cNvPicPr>
+            <a:picLocks noChangeAspect="1"/>
+          </p:cNvPicPr>
+          <p:nvPr/>
+        </p:nvPicPr>
+        <p:blipFill>
+          <a:blip r:embed="rId3"/>
+          <a:stretch>
+            <a:fillRect/>
+          </a:stretch>
+        </p:blipFill>
+        <p:spPr>
+          <a:xfrm>
+            <a:off x="1120000" y="1825625"/>
+            <a:ext cx="4781727" cy="3689350"/>
+          </a:xfrm>
+          <a:prstGeom prst="rect">
+            <a:avLst/>
+          </a:prstGeom>
+        </p:spPr>
+      </p:pic>
+      <p:sp>
+        <p:nvSpPr>
+          <p:cNvPr id="6" name="TextBox 5"/>
+          <p:cNvSpPr txBox="1"/>
+          <p:nvPr/>
+        </p:nvSpPr>
+        <p:spPr>
+          <a:xfrm>
+            <a:off x="6772275" y="5693365"/>
+            <a:ext cx="4581526" cy="307777"/>
+          </a:xfrm>
+          <a:prstGeom prst="rect">
+            <a:avLst/>
+          </a:prstGeom>
+          <a:noFill/>
+        </p:spPr>
+        <p:txBody>
+          <a:bodyPr wrap="square" rtlCol="0">
+            <a:spAutoFit/>
+          </a:bodyPr>
+          <a:lstStyle/>
+          <a:p>
+            <a:pPr algn="ctr"/>
+            <a:r>
+              <a:rPr lang="en-US" sz="1400" dirty="0">
+                <a:latin typeface="Garamond" charset="0"/>
+                <a:ea typeface="Garamond" charset="0"/>
+                <a:cs typeface="Garamond" charset="0"/>
+              </a:rPr>
+              <a:t>Average error on random walk problem after </a:t>
+            </a:r>
+            <a:r>
+              <a:rPr lang="en-US" sz="1400" dirty="0" smtClean="0">
+                <a:latin typeface="Garamond" charset="0"/>
+                <a:ea typeface="Garamond" charset="0"/>
+                <a:cs typeface="Garamond" charset="0"/>
+              </a:rPr>
+              <a:t>10 </a:t>
+            </a:r>
+            <a:r>
+              <a:rPr lang="en-US" sz="1400" dirty="0">
+                <a:latin typeface="Garamond" charset="0"/>
+                <a:ea typeface="Garamond" charset="0"/>
+                <a:cs typeface="Garamond" charset="0"/>
+              </a:rPr>
+              <a:t>sequences</a:t>
+            </a:r>
+          </a:p>
+        </p:txBody>
+      </p:sp>
+    </p:spTree>
+    <p:extLst>
+      <p:ext uri="{BB962C8B-B14F-4D97-AF65-F5344CB8AC3E}">
+        <p14:creationId xmlns:p14="http://schemas.microsoft.com/office/powerpoint/2010/main" val="76771382"/>
+      </p:ext>
+    </p:extLst>
+  </p:cSld>
+  <p:clrMapOvr>
+    <a:masterClrMapping/>
+  </p:clrMapOvr>
+  <p:timing>
+    <p:tnLst>
+      <p:par>
+        <p:cTn id="1" dur="indefinite" restart="never" nodeType="tmRoot"/>
+      </p:par>
+    </p:tnLst>
+  </p:timing>
+</p:sld>
+</file>
+
+<file path=ppt/slides/slide7.xml><?xml version="1.0" encoding="utf-8"?>
+<p:sld xmlns:a="http://schemas.openxmlformats.org/drawingml/2006/main" xmlns:r="http://schemas.openxmlformats.org/officeDocument/2006/relationships" xmlns:p="http://schemas.openxmlformats.org/presentationml/2006/main">
+  <p:cSld>
+    <p:spTree>
+      <p:nvGrpSpPr>
+        <p:cNvPr id="1" name=""/>
+        <p:cNvGrpSpPr/>
+        <p:nvPr/>
+      </p:nvGrpSpPr>
+      <p:grpSpPr>
+        <a:xfrm>
+          <a:off x="0" y="0"/>
+          <a:ext cx="0" cy="0"/>
+          <a:chOff x="0" y="0"/>
+          <a:chExt cx="0" cy="0"/>
+        </a:xfrm>
+      </p:grpSpPr>
+      <p:sp>
+        <p:nvSpPr>
+          <p:cNvPr id="2" name="Title 1"/>
+          <p:cNvSpPr>
+            <a:spLocks noGrp="1"/>
+          </p:cNvSpPr>
+          <p:nvPr>
+            <p:ph type="title"/>
+          </p:nvPr>
+        </p:nvSpPr>
+        <p:spPr/>
+        <p:txBody>
+          <a:bodyPr>
+            <a:normAutofit fontScale="90000"/>
+          </a:bodyPr>
+          <a:lstStyle/>
+          <a:p>
+            <a:r>
+              <a:rPr lang="en-US" dirty="0">
+                <a:latin typeface="Garamond" charset="0"/>
+                <a:ea typeface="Garamond" charset="0"/>
+                <a:cs typeface="Garamond" charset="0"/>
+              </a:rPr>
+              <a:t>Experiment 2 - Experiencing 10 sequences</a:t>
+            </a:r>
+            <a:endParaRPr lang="en-US" dirty="0"/>
+          </a:p>
+        </p:txBody>
+      </p:sp>
+      <p:pic>
+        <p:nvPicPr>
+          <p:cNvPr id="4" name="Picture 3"/>
+          <p:cNvPicPr>
+            <a:picLocks noChangeAspect="1"/>
+          </p:cNvPicPr>
+          <p:nvPr/>
+        </p:nvPicPr>
+        <p:blipFill>
+          <a:blip r:embed="rId2"/>
+          <a:stretch>
+            <a:fillRect/>
+          </a:stretch>
+        </p:blipFill>
+        <p:spPr>
+          <a:xfrm>
+            <a:off x="6786562" y="1825625"/>
+            <a:ext cx="4567237" cy="3683508"/>
+          </a:xfrm>
+          <a:prstGeom prst="rect">
+            <a:avLst/>
+          </a:prstGeom>
+        </p:spPr>
+      </p:pic>
+      <p:sp>
+        <p:nvSpPr>
+          <p:cNvPr id="7" name="TextBox 6"/>
+          <p:cNvSpPr txBox="1"/>
+          <p:nvPr/>
+        </p:nvSpPr>
+        <p:spPr>
+          <a:xfrm>
+            <a:off x="6772275" y="5693365"/>
+            <a:ext cx="4581526" cy="307777"/>
+          </a:xfrm>
+          <a:prstGeom prst="rect">
+            <a:avLst/>
+          </a:prstGeom>
+          <a:noFill/>
+        </p:spPr>
+        <p:txBody>
+          <a:bodyPr wrap="square" rtlCol="0">
+            <a:spAutoFit/>
+          </a:bodyPr>
+          <a:lstStyle/>
+          <a:p>
+            <a:pPr algn="ctr"/>
+            <a:r>
+              <a:rPr lang="en-US" sz="1400" dirty="0">
+                <a:latin typeface="Garamond" charset="0"/>
+                <a:ea typeface="Garamond" charset="0"/>
+                <a:cs typeface="Garamond" charset="0"/>
+              </a:rPr>
+              <a:t>Average error </a:t>
+            </a:r>
+            <a:r>
+              <a:rPr lang="en-US" sz="1400" dirty="0" smtClean="0">
+                <a:latin typeface="Garamond" charset="0"/>
+                <a:ea typeface="Garamond" charset="0"/>
+                <a:cs typeface="Garamond" charset="0"/>
+              </a:rPr>
+              <a:t>at best </a:t>
+            </a:r>
+            <a:r>
+              <a:rPr lang="el-GR" sz="1400" dirty="0">
+                <a:latin typeface="Garamond" charset="0"/>
+                <a:ea typeface="Garamond" charset="0"/>
+                <a:cs typeface="Garamond" charset="0"/>
+              </a:rPr>
+              <a:t>α </a:t>
+            </a:r>
+            <a:r>
+              <a:rPr lang="en-US" sz="1400" dirty="0" smtClean="0">
+                <a:latin typeface="Garamond" charset="0"/>
+                <a:ea typeface="Garamond" charset="0"/>
+                <a:cs typeface="Garamond" charset="0"/>
+              </a:rPr>
+              <a:t>on random-walk problem</a:t>
+            </a:r>
+            <a:endParaRPr lang="en-US" sz="1400" dirty="0">
+              <a:latin typeface="Garamond" charset="0"/>
+              <a:ea typeface="Garamond" charset="0"/>
+              <a:cs typeface="Garamond" charset="0"/>
+            </a:endParaRPr>
+          </a:p>
+        </p:txBody>
+      </p:sp>
+      <p:sp>
+        <p:nvSpPr>
+          <p:cNvPr id="8" name="Content Placeholder 4"/>
+          <p:cNvSpPr>
+            <a:spLocks noGrp="1"/>
+          </p:cNvSpPr>
+          <p:nvPr>
+            <p:ph idx="1"/>
+          </p:nvPr>
+        </p:nvSpPr>
+        <p:spPr>
+          <a:xfrm>
+            <a:off x="1120000" y="1825625"/>
+            <a:ext cx="5537975" cy="4789488"/>
+          </a:xfrm>
+        </p:spPr>
+        <p:txBody>
+          <a:bodyPr/>
+          <a:lstStyle/>
+          <a:p>
+            <a:r>
+              <a:rPr lang="en-US" sz="2400" dirty="0" smtClean="0">
+                <a:latin typeface="Garamond" charset="0"/>
+                <a:ea typeface="Garamond" charset="0"/>
+                <a:cs typeface="Garamond" charset="0"/>
+              </a:rPr>
+              <a:t>Method and parameters:</a:t>
+            </a:r>
+          </a:p>
+          <a:p>
+            <a:pPr lvl="1"/>
+            <a:r>
+              <a:rPr lang="en-US" sz="2000" dirty="0" smtClean="0">
+                <a:latin typeface="Garamond" charset="0"/>
+                <a:ea typeface="Garamond" charset="0"/>
+                <a:cs typeface="Garamond" charset="0"/>
+              </a:rPr>
+              <a:t>Calculate mean error for each </a:t>
+            </a:r>
+            <a:r>
+              <a:rPr lang="el-GR" sz="2000" dirty="0">
+                <a:latin typeface="Garamond" charset="0"/>
+                <a:ea typeface="Garamond" charset="0"/>
+                <a:cs typeface="Garamond" charset="0"/>
+              </a:rPr>
+              <a:t>λ </a:t>
+            </a:r>
+            <a:r>
+              <a:rPr lang="en-US" sz="2000" dirty="0" smtClean="0">
+                <a:latin typeface="Garamond" charset="0"/>
+                <a:ea typeface="Garamond" charset="0"/>
+                <a:cs typeface="Garamond" charset="0"/>
+              </a:rPr>
+              <a:t>using the corresponding  best </a:t>
+            </a:r>
+            <a:r>
+              <a:rPr lang="el-GR" sz="2000" dirty="0">
+                <a:latin typeface="Garamond" charset="0"/>
+                <a:ea typeface="Garamond" charset="0"/>
+                <a:cs typeface="Garamond" charset="0"/>
+              </a:rPr>
+              <a:t>α</a:t>
+            </a:r>
+            <a:endParaRPr lang="en-US" sz="2000" dirty="0" smtClean="0">
+              <a:latin typeface="Garamond" charset="0"/>
+              <a:ea typeface="Garamond" charset="0"/>
+              <a:cs typeface="Garamond" charset="0"/>
+            </a:endParaRPr>
+          </a:p>
+          <a:p>
+            <a:r>
+              <a:rPr lang="en-US" sz="2400" dirty="0" smtClean="0">
+                <a:latin typeface="Garamond" charset="0"/>
+                <a:ea typeface="Garamond" charset="0"/>
+                <a:cs typeface="Garamond" charset="0"/>
+              </a:rPr>
+              <a:t>Results:</a:t>
+            </a:r>
+          </a:p>
+          <a:p>
+            <a:pPr lvl="1"/>
+            <a:r>
+              <a:rPr lang="en-US" sz="2000" dirty="0" smtClean="0">
+                <a:latin typeface="Garamond" charset="0"/>
+                <a:ea typeface="Garamond" charset="0"/>
+                <a:cs typeface="Garamond" charset="0"/>
+              </a:rPr>
+              <a:t>TD(0) did not performed the best (matched paper results)</a:t>
+            </a:r>
+          </a:p>
+          <a:p>
+            <a:pPr lvl="1"/>
+            <a:r>
+              <a:rPr lang="en-US" sz="2000" dirty="0" smtClean="0">
+                <a:latin typeface="Garamond" charset="0"/>
+                <a:ea typeface="Garamond" charset="0"/>
+                <a:cs typeface="Garamond" charset="0"/>
+              </a:rPr>
+              <a:t>TD(0.2) performed best (TD(0.3) in the paper</a:t>
+            </a:r>
+          </a:p>
+          <a:p>
+            <a:pPr lvl="1"/>
+            <a:r>
+              <a:rPr lang="en-US" sz="2000" dirty="0" smtClean="0">
+                <a:latin typeface="Garamond" charset="0"/>
+                <a:ea typeface="Garamond" charset="0"/>
+                <a:cs typeface="Garamond" charset="0"/>
+              </a:rPr>
+              <a:t>Trends matches Figure 5 in Sutton’s paper</a:t>
+            </a:r>
+            <a:endParaRPr lang="en-US" sz="2000" dirty="0">
+              <a:latin typeface="Garamond" charset="0"/>
+              <a:ea typeface="Garamond" charset="0"/>
+              <a:cs typeface="Garamond" charset="0"/>
+            </a:endParaRPr>
+          </a:p>
+          <a:p>
+            <a:pPr lvl="1"/>
+            <a:endParaRPr lang="en-US" dirty="0">
+              <a:latin typeface="Garamond" charset="0"/>
+              <a:ea typeface="Garamond" charset="0"/>
+              <a:cs typeface="Garamond" charset="0"/>
+            </a:endParaRPr>
+          </a:p>
+          <a:p>
+            <a:pPr lvl="1"/>
+            <a:endParaRPr lang="en-US" dirty="0">
+              <a:latin typeface="Garamond" charset="0"/>
+              <a:ea typeface="Garamond" charset="0"/>
+              <a:cs typeface="Garamond" charset="0"/>
+            </a:endParaRPr>
+          </a:p>
+          <a:p>
+            <a:pPr lvl="1"/>
+            <a:endParaRPr lang="en-US" dirty="0">
+              <a:latin typeface="Garamond" charset="0"/>
+              <a:ea typeface="Garamond" charset="0"/>
+              <a:cs typeface="Garamond" charset="0"/>
+            </a:endParaRPr>
+          </a:p>
+        </p:txBody>
+      </p:sp>
+    </p:spTree>
+    <p:extLst>
+      <p:ext uri="{BB962C8B-B14F-4D97-AF65-F5344CB8AC3E}">
+        <p14:creationId xmlns:p14="http://schemas.microsoft.com/office/powerpoint/2010/main" val="1850605041"/>
+      </p:ext>
+    </p:extLst>
+  </p:cSld>
+  <p:clrMapOvr>
+    <a:masterClrMapping/>
+  </p:clrMapOvr>
+  <p:timing>
+    <p:tnLst>
+      <p:par>
+        <p:cTn id="1" dur="indefinite" restart="never" nodeType="tmRoot"/>
+      </p:par>
+    </p:tnLst>
+  </p:timing>
+</p:sld>
+</file>
+
+<file path=ppt/slides/slide8.xml><?xml version="1.0" encoding="utf-8"?>
+<p:sld xmlns:a="http://schemas.openxmlformats.org/drawingml/2006/main" xmlns:r="http://schemas.openxmlformats.org/officeDocument/2006/relationships" xmlns:p="http://schemas.openxmlformats.org/presentationml/2006/main">
+  <p:cSld>
+    <p:spTree>
+      <p:nvGrpSpPr>
+        <p:cNvPr id="1" name=""/>
+        <p:cNvGrpSpPr/>
+        <p:nvPr/>
+      </p:nvGrpSpPr>
+      <p:grpSpPr>
+        <a:xfrm>
+          <a:off x="0" y="0"/>
+          <a:ext cx="0" cy="0"/>
+          <a:chOff x="0" y="0"/>
+          <a:chExt cx="0" cy="0"/>
+        </a:xfrm>
+      </p:grpSpPr>
+      <p:sp>
+        <p:nvSpPr>
+          <p:cNvPr id="2" name="Title 1"/>
+          <p:cNvSpPr>
+            <a:spLocks noGrp="1"/>
+          </p:cNvSpPr>
+          <p:nvPr>
+            <p:ph type="title"/>
+          </p:nvPr>
+        </p:nvSpPr>
+        <p:spPr/>
+        <p:txBody>
+          <a:bodyPr>
+            <a:normAutofit fontScale="90000"/>
+          </a:bodyPr>
+          <a:lstStyle/>
+          <a:p>
+            <a:r>
+              <a:rPr lang="en-US" dirty="0">
+                <a:latin typeface="Garamond" charset="0"/>
+                <a:ea typeface="Garamond" charset="0"/>
+                <a:cs typeface="Garamond" charset="0"/>
+              </a:rPr>
+              <a:t>Experiment 2 - Experiencing 10 sequences</a:t>
+            </a:r>
+            <a:endParaRPr lang="en-US" dirty="0"/>
+          </a:p>
+        </p:txBody>
+      </p:sp>
+      <p:sp>
+        <p:nvSpPr>
+          <p:cNvPr id="3" name="Content Placeholder 2"/>
+          <p:cNvSpPr>
+            <a:spLocks noGrp="1"/>
+          </p:cNvSpPr>
+          <p:nvPr>
+            <p:ph idx="1"/>
+          </p:nvPr>
+        </p:nvSpPr>
+        <p:spPr/>
+        <p:txBody>
+          <a:bodyPr/>
+          <a:lstStyle/>
+          <a:p>
+            <a:endParaRPr lang="en-US" dirty="0"/>
+          </a:p>
+        </p:txBody>
+      </p:sp>
+      <p:pic>
+        <p:nvPicPr>
+          <p:cNvPr id="4" name="Picture 3"/>
+          <p:cNvPicPr>
+            <a:picLocks noChangeAspect="1"/>
+          </p:cNvPicPr>
+          <p:nvPr/>
+        </p:nvPicPr>
+        <p:blipFill>
+          <a:blip r:embed="rId2"/>
+          <a:stretch>
+            <a:fillRect/>
+          </a:stretch>
+        </p:blipFill>
+        <p:spPr>
+          <a:xfrm>
+            <a:off x="6786562" y="1825625"/>
+            <a:ext cx="4567237" cy="3683508"/>
+          </a:xfrm>
+          <a:prstGeom prst="rect">
+            <a:avLst/>
+          </a:prstGeom>
+        </p:spPr>
+      </p:pic>
+      <p:pic>
+        <p:nvPicPr>
+          <p:cNvPr id="5" name="Picture 4"/>
+          <p:cNvPicPr>
+            <a:picLocks noChangeAspect="1"/>
+          </p:cNvPicPr>
+          <p:nvPr/>
+        </p:nvPicPr>
+        <p:blipFill>
+          <a:blip r:embed="rId3"/>
+          <a:stretch>
+            <a:fillRect/>
+          </a:stretch>
+        </p:blipFill>
+        <p:spPr>
+          <a:xfrm>
+            <a:off x="1120000" y="1825625"/>
+            <a:ext cx="4801667" cy="3660775"/>
+          </a:xfrm>
+          <a:prstGeom prst="rect">
+            <a:avLst/>
+          </a:prstGeom>
+        </p:spPr>
+      </p:pic>
+      <p:sp>
+        <p:nvSpPr>
+          <p:cNvPr id="7" name="TextBox 6"/>
+          <p:cNvSpPr txBox="1"/>
+          <p:nvPr/>
+        </p:nvSpPr>
+        <p:spPr>
+          <a:xfrm>
+            <a:off x="6772275" y="5693365"/>
+            <a:ext cx="4581526" cy="307777"/>
+          </a:xfrm>
+          <a:prstGeom prst="rect">
+            <a:avLst/>
+          </a:prstGeom>
+          <a:noFill/>
+        </p:spPr>
+        <p:txBody>
+          <a:bodyPr wrap="square" rtlCol="0">
+            <a:spAutoFit/>
+          </a:bodyPr>
+          <a:lstStyle/>
+          <a:p>
+            <a:pPr algn="ctr"/>
+            <a:r>
+              <a:rPr lang="en-US" sz="1400" dirty="0">
+                <a:latin typeface="Garamond" charset="0"/>
+                <a:ea typeface="Garamond" charset="0"/>
+                <a:cs typeface="Garamond" charset="0"/>
+              </a:rPr>
+              <a:t>Average error </a:t>
+            </a:r>
+            <a:r>
+              <a:rPr lang="en-US" sz="1400" dirty="0" smtClean="0">
+                <a:latin typeface="Garamond" charset="0"/>
+                <a:ea typeface="Garamond" charset="0"/>
+                <a:cs typeface="Garamond" charset="0"/>
+              </a:rPr>
+              <a:t>at best </a:t>
+            </a:r>
+            <a:r>
+              <a:rPr lang="el-GR" sz="1400" dirty="0">
+                <a:latin typeface="Garamond" charset="0"/>
+                <a:ea typeface="Garamond" charset="0"/>
+                <a:cs typeface="Garamond" charset="0"/>
+              </a:rPr>
+              <a:t>α </a:t>
+            </a:r>
+            <a:r>
+              <a:rPr lang="en-US" sz="1400" dirty="0" smtClean="0">
+                <a:latin typeface="Garamond" charset="0"/>
+                <a:ea typeface="Garamond" charset="0"/>
+                <a:cs typeface="Garamond" charset="0"/>
+              </a:rPr>
+              <a:t>on random-walk problem</a:t>
+            </a:r>
+            <a:endParaRPr lang="en-US" sz="1400" dirty="0">
+              <a:latin typeface="Garamond" charset="0"/>
+              <a:ea typeface="Garamond" charset="0"/>
+              <a:cs typeface="Garamond" charset="0"/>
+            </a:endParaRPr>
+          </a:p>
+        </p:txBody>
+      </p:sp>
+    </p:spTree>
+    <p:extLst>
+      <p:ext uri="{BB962C8B-B14F-4D97-AF65-F5344CB8AC3E}">
+        <p14:creationId xmlns:p14="http://schemas.microsoft.com/office/powerpoint/2010/main" val="1785563878"/>
+      </p:ext>
+    </p:extLst>
+  </p:cSld>
+  <p:clrMapOvr>
+    <a:masterClrMapping/>
+  </p:clrMapOvr>
+  <p:timing>
+    <p:tnLst>
+      <p:par>
+        <p:cTn id="1" dur="indefinite" restart="never" nodeType="tmRoot"/>
+      </p:par>
+    </p:tnLst>
+  </p:timing>
+</p:sld>
+</file>
+
+<file path=ppt/slides/slide9.xml><?xml version="1.0" encoding="utf-8"?>
+<p:sld xmlns:a="http://schemas.openxmlformats.org/drawingml/2006/main" xmlns:r="http://schemas.openxmlformats.org/officeDocument/2006/relationships" xmlns:p="http://schemas.openxmlformats.org/presentationml/2006/main">
+  <p:cSld>
+    <p:spTree>
+      <p:nvGrpSpPr>
+        <p:cNvPr id="1" name=""/>
+        <p:cNvGrpSpPr/>
+        <p:nvPr/>
+      </p:nvGrpSpPr>
+      <p:grpSpPr>
+        <a:xfrm>
+          <a:off x="0" y="0"/>
+          <a:ext cx="0" cy="0"/>
+          <a:chOff x="0" y="0"/>
+          <a:chExt cx="0" cy="0"/>
+        </a:xfrm>
+      </p:grpSpPr>
+      <p:sp>
+        <p:nvSpPr>
+          <p:cNvPr id="2" name="Title 1"/>
+          <p:cNvSpPr>
+            <a:spLocks noGrp="1"/>
+          </p:cNvSpPr>
+          <p:nvPr>
+            <p:ph type="title"/>
+          </p:nvPr>
+        </p:nvSpPr>
+        <p:spPr/>
+        <p:txBody>
+          <a:bodyPr/>
+          <a:lstStyle/>
+          <a:p>
+            <a:r>
+              <a:rPr lang="en-US" dirty="0" smtClean="0">
+                <a:latin typeface="Garamond" charset="0"/>
+                <a:ea typeface="Garamond" charset="0"/>
+                <a:cs typeface="Garamond" charset="0"/>
+              </a:rPr>
+              <a:t>Possible explanation</a:t>
+            </a:r>
+            <a:endParaRPr lang="en-US" dirty="0">
+              <a:latin typeface="Garamond" charset="0"/>
+              <a:ea typeface="Garamond" charset="0"/>
+              <a:cs typeface="Garamond" charset="0"/>
+            </a:endParaRPr>
+          </a:p>
+        </p:txBody>
+      </p:sp>
+      <p:sp>
+        <p:nvSpPr>
+          <p:cNvPr id="3" name="Content Placeholder 2"/>
+          <p:cNvSpPr>
+            <a:spLocks noGrp="1"/>
+          </p:cNvSpPr>
+          <p:nvPr>
+            <p:ph idx="1"/>
+          </p:nvPr>
+        </p:nvSpPr>
+        <p:spPr/>
+        <p:txBody>
+          <a:bodyPr/>
+          <a:lstStyle/>
+          <a:p>
+            <a:r>
+              <a:rPr lang="en-US" dirty="0" smtClean="0">
+                <a:latin typeface="Garamond" charset="0"/>
+                <a:ea typeface="Garamond" charset="0"/>
+                <a:cs typeface="Garamond" charset="0"/>
+              </a:rPr>
+              <a:t>The results supports the paper’s claim</a:t>
+            </a:r>
+          </a:p>
+          <a:p>
+            <a:r>
+              <a:rPr lang="en-US" dirty="0" smtClean="0">
+                <a:latin typeface="Garamond" charset="0"/>
+                <a:ea typeface="Garamond" charset="0"/>
+                <a:cs typeface="Garamond" charset="0"/>
+              </a:rPr>
+              <a:t>Not a perfect match though</a:t>
+            </a:r>
+          </a:p>
+          <a:p>
+            <a:pPr lvl="1"/>
+            <a:r>
+              <a:rPr lang="en-US" dirty="0" smtClean="0">
+                <a:latin typeface="Garamond" charset="0"/>
+                <a:ea typeface="Garamond" charset="0"/>
+                <a:cs typeface="Garamond" charset="0"/>
+              </a:rPr>
+              <a:t>Numerical differences</a:t>
+            </a:r>
+          </a:p>
+          <a:p>
+            <a:pPr lvl="1"/>
+            <a:r>
+              <a:rPr lang="en-US" smtClean="0">
+                <a:latin typeface="Garamond" charset="0"/>
+                <a:ea typeface="Garamond" charset="0"/>
+                <a:cs typeface="Garamond" charset="0"/>
+              </a:rPr>
+              <a:t>Randomly generated training set</a:t>
+            </a:r>
+            <a:endParaRPr lang="en-US" dirty="0" smtClean="0">
+              <a:latin typeface="Garamond" charset="0"/>
+              <a:ea typeface="Garamond" charset="0"/>
+              <a:cs typeface="Garamond" charset="0"/>
+            </a:endParaRPr>
+          </a:p>
+          <a:p>
+            <a:pPr lvl="1"/>
+            <a:r>
+              <a:rPr lang="en-US" dirty="0" smtClean="0">
+                <a:latin typeface="Garamond" charset="0"/>
+                <a:ea typeface="Garamond" charset="0"/>
+                <a:cs typeface="Garamond" charset="0"/>
+              </a:rPr>
+              <a:t>Unreported </a:t>
+            </a:r>
+            <a:r>
+              <a:rPr lang="el-GR" dirty="0" smtClean="0">
+                <a:latin typeface="Garamond" charset="0"/>
+                <a:ea typeface="Garamond" charset="0"/>
+                <a:cs typeface="Garamond" charset="0"/>
+              </a:rPr>
+              <a:t>α</a:t>
+            </a:r>
+            <a:r>
+              <a:rPr lang="en-US" dirty="0" smtClean="0">
+                <a:latin typeface="Garamond" charset="0"/>
+                <a:ea typeface="Garamond" charset="0"/>
+                <a:cs typeface="Garamond" charset="0"/>
+              </a:rPr>
+              <a:t> and </a:t>
+            </a:r>
+            <a:r>
+              <a:rPr lang="el-GR" dirty="0" smtClean="0">
+                <a:latin typeface="Garamond" charset="0"/>
+                <a:ea typeface="Garamond" charset="0"/>
+                <a:cs typeface="Garamond" charset="0"/>
+              </a:rPr>
+              <a:t>ε</a:t>
+            </a:r>
+            <a:r>
+              <a:rPr lang="en-US" dirty="0" smtClean="0">
+                <a:latin typeface="Garamond" charset="0"/>
+                <a:ea typeface="Garamond" charset="0"/>
+                <a:cs typeface="Garamond" charset="0"/>
+              </a:rPr>
+              <a:t> in experiment 1</a:t>
+            </a:r>
+            <a:endParaRPr lang="en-US" dirty="0">
+              <a:latin typeface="Garamond" charset="0"/>
+              <a:ea typeface="Garamond" charset="0"/>
+              <a:cs typeface="Garamond" charset="0"/>
+            </a:endParaRPr>
+          </a:p>
+        </p:txBody>
+      </p:sp>
+    </p:spTree>
+    <p:extLst>
+      <p:ext uri="{BB962C8B-B14F-4D97-AF65-F5344CB8AC3E}">
+        <p14:creationId xmlns:p14="http://schemas.microsoft.com/office/powerpoint/2010/main" val="1831937923"/>
+      </p:ext>
+    </p:extLst>
+  </p:cSld>
+  <p:clrMapOvr>
+    <a:masterClrMapping/>
+  </p:clrMapOvr>
 </p:sld>
 </file>
 

</xml_diff>

<commit_message>
generated scrpts for presentation; added report, updated powerpoint
</commit_message>
<xml_diff>
--- a/finalProject_RL_8803_fall2015.pptx
+++ b/finalProject_RL_8803_fall2015.pptx
@@ -5897,15 +5897,7 @@
                 <a:ea typeface="Garamond" charset="0"/>
                 <a:cs typeface="Garamond" charset="0"/>
               </a:rPr>
-              <a:t>Five</a:t>
-            </a:r>
-            <a:r>
-              <a:rPr lang="en-US" dirty="0" smtClean="0">
-                <a:latin typeface="Garamond" charset="0"/>
-                <a:ea typeface="Garamond" charset="0"/>
-                <a:cs typeface="Garamond" charset="0"/>
-              </a:rPr>
-              <a:t>-step Random-walk</a:t>
+              <a:t>Five-step Random-walk</a:t>
             </a:r>
             <a:endParaRPr lang="en-US" dirty="0">
               <a:latin typeface="Garamond" charset="0"/>
@@ -5964,42 +5956,15 @@
                 <a:ea typeface="Garamond" charset="0"/>
                 <a:cs typeface="Garamond" charset="0"/>
               </a:rPr>
-              <a:t>50% chance move right or left</a:t>
-            </a:r>
-          </a:p>
-          <a:p>
-            <a:pPr lvl="1"/>
+              <a:t>50% chance move right or </a:t>
+            </a:r>
             <a:r>
               <a:rPr lang="en-US" dirty="0" smtClean="0">
                 <a:latin typeface="Garamond" charset="0"/>
                 <a:ea typeface="Garamond" charset="0"/>
                 <a:cs typeface="Garamond" charset="0"/>
               </a:rPr>
-              <a:t>Ideal prediction of ending the walk at G is T = </a:t>
-            </a:r>
-            <a:r>
-              <a:rPr lang="bg-BG" dirty="0" smtClean="0">
-                <a:latin typeface="Garamond" charset="0"/>
-                <a:ea typeface="Garamond" charset="0"/>
-                <a:cs typeface="Garamond" charset="0"/>
-              </a:rPr>
-              <a:t>{1/6 </a:t>
-            </a:r>
-            <a:r>
-              <a:rPr lang="bg-BG" dirty="0">
-                <a:latin typeface="Garamond" charset="0"/>
-                <a:ea typeface="Garamond" charset="0"/>
-                <a:cs typeface="Garamond" charset="0"/>
-              </a:rPr>
-              <a:t>2/6 3/6 4/6 5/6</a:t>
-            </a:r>
-            <a:r>
-              <a:rPr lang="bg-BG" dirty="0" smtClean="0">
-                <a:latin typeface="Garamond" charset="0"/>
-                <a:ea typeface="Garamond" charset="0"/>
-                <a:cs typeface="Garamond" charset="0"/>
-              </a:rPr>
-              <a:t>}</a:t>
+              <a:t>left</a:t>
             </a:r>
             <a:endParaRPr lang="en-US" dirty="0" smtClean="0">
               <a:latin typeface="Garamond" charset="0"/>
@@ -6014,7 +5979,71 @@
                 <a:ea typeface="Garamond" charset="0"/>
                 <a:cs typeface="Garamond" charset="0"/>
               </a:rPr>
-              <a:t>Goal: estimate weight vector w, which is the expected values of T</a:t>
+              <a:t>Goal: estimate weight </a:t>
+            </a:r>
+            <a:r>
+              <a:rPr lang="en-US" smtClean="0">
+                <a:latin typeface="Garamond" charset="0"/>
+                <a:ea typeface="Garamond" charset="0"/>
+                <a:cs typeface="Garamond" charset="0"/>
+              </a:rPr>
+              <a:t>vector </a:t>
+            </a:r>
+            <a:r>
+              <a:rPr lang="en-US" smtClean="0">
+                <a:latin typeface="Garamond" charset="0"/>
+                <a:ea typeface="Garamond" charset="0"/>
+                <a:cs typeface="Garamond" charset="0"/>
+              </a:rPr>
+              <a:t>w</a:t>
+            </a:r>
+            <a:endParaRPr lang="en-US" dirty="0" smtClean="0">
+              <a:latin typeface="Garamond" charset="0"/>
+              <a:ea typeface="Garamond" charset="0"/>
+              <a:cs typeface="Garamond" charset="0"/>
+            </a:endParaRPr>
+          </a:p>
+          <a:p>
+            <a:pPr lvl="1"/>
+            <a:r>
+              <a:rPr lang="en-US" dirty="0">
+                <a:latin typeface="Garamond" charset="0"/>
+                <a:ea typeface="Garamond" charset="0"/>
+                <a:cs typeface="Garamond" charset="0"/>
+              </a:rPr>
+              <a:t>Ideal prediction </a:t>
+            </a:r>
+            <a:r>
+              <a:rPr lang="en-US" dirty="0" smtClean="0">
+                <a:latin typeface="Garamond" charset="0"/>
+                <a:ea typeface="Garamond" charset="0"/>
+                <a:cs typeface="Garamond" charset="0"/>
+              </a:rPr>
+              <a:t>is </a:t>
+            </a:r>
+            <a:r>
+              <a:rPr lang="en-US" dirty="0">
+                <a:latin typeface="Garamond" charset="0"/>
+                <a:ea typeface="Garamond" charset="0"/>
+                <a:cs typeface="Garamond" charset="0"/>
+              </a:rPr>
+              <a:t>T = </a:t>
+            </a:r>
+            <a:r>
+              <a:rPr lang="bg-BG" dirty="0">
+                <a:latin typeface="Garamond" charset="0"/>
+                <a:ea typeface="Garamond" charset="0"/>
+                <a:cs typeface="Garamond" charset="0"/>
+              </a:rPr>
+              <a:t>{1/6 2/6 3/6 4/6 5/6</a:t>
+            </a:r>
+            <a:r>
+              <a:rPr lang="bg-BG" dirty="0" smtClean="0">
+                <a:latin typeface="Garamond" charset="0"/>
+                <a:ea typeface="Garamond" charset="0"/>
+                <a:cs typeface="Garamond" charset="0"/>
+              </a:rPr>
+              <a:t>}</a:t>
             </a:r>
             <a:endParaRPr lang="en-US" dirty="0">
               <a:latin typeface="Garamond" charset="0"/>
@@ -6179,15 +6208,7 @@
                 <a:ea typeface="Garamond" charset="0"/>
                 <a:cs typeface="Garamond" charset="0"/>
               </a:rPr>
-              <a:t>Initial weight was </a:t>
-            </a:r>
-            <a:r>
-              <a:rPr lang="en-US" sz="2000" dirty="0" smtClean="0">
-                <a:latin typeface="Garamond" charset="0"/>
-                <a:ea typeface="Garamond" charset="0"/>
-                <a:cs typeface="Garamond" charset="0"/>
-              </a:rPr>
-              <a:t>set to 0.5</a:t>
+              <a:t>Initial weight was set to 0.5</a:t>
             </a:r>
           </a:p>
           <a:p>
@@ -6734,11 +6755,6 @@
               </a:rPr>
               <a:t>10 sequences</a:t>
             </a:r>
-            <a:endParaRPr lang="en-US" dirty="0">
-              <a:latin typeface="Garamond" charset="0"/>
-              <a:ea typeface="Garamond" charset="0"/>
-              <a:cs typeface="Garamond" charset="0"/>
-            </a:endParaRPr>
           </a:p>
         </p:txBody>
       </p:sp>
@@ -6803,15 +6819,7 @@
                 <a:ea typeface="Garamond" charset="0"/>
                 <a:cs typeface="Garamond" charset="0"/>
               </a:rPr>
-              <a:t>Initial weight was </a:t>
-            </a:r>
-            <a:r>
-              <a:rPr lang="en-US" sz="2000" dirty="0" smtClean="0">
-                <a:latin typeface="Garamond" charset="0"/>
-                <a:ea typeface="Garamond" charset="0"/>
-                <a:cs typeface="Garamond" charset="0"/>
-              </a:rPr>
-              <a:t>set to 0.5</a:t>
+              <a:t>Initial weight was set to 0.5</a:t>
             </a:r>
           </a:p>
           <a:p>

</xml_diff>